<commit_message>
Started slides about unique identifiers
</commit_message>
<xml_diff>
--- a/images/detect_pilot_graphics.pptx
+++ b/images/detect_pilot_graphics.pptx
@@ -5,11 +5,12 @@
     <p:sldMasterId id="2147483648" r:id="rId1"/>
   </p:sldMasterIdLst>
   <p:notesMasterIdLst>
-    <p:notesMasterId r:id="rId4"/>
+    <p:notesMasterId r:id="rId5"/>
   </p:notesMasterIdLst>
   <p:sldIdLst>
     <p:sldId id="256" r:id="rId2"/>
     <p:sldId id="258" r:id="rId3"/>
+    <p:sldId id="259" r:id="rId4"/>
   </p:sldIdLst>
   <p:sldSz cx="12192000" cy="6858000"/>
   <p:notesSz cx="6858000" cy="9144000"/>
@@ -198,7 +199,7 @@
           <a:p>
             <a:fld id="{100C7322-DBA3-BF43-82FB-6F78055E2C71}" type="datetimeFigureOut">
               <a:rPr lang="en-US" smtClean="0"/>
-              <a:t>1/28/18</a:t>
+              <a:t>3/16/18</a:t>
             </a:fld>
             <a:endParaRPr lang="en-US"/>
           </a:p>
@@ -549,6 +550,202 @@
 </p:notes>
 </file>
 
+<file path=ppt/notesSlides/notesSlide2.xml><?xml version="1.0" encoding="utf-8"?>
+<p:notes xmlns:a="http://schemas.openxmlformats.org/drawingml/2006/main" xmlns:r="http://schemas.openxmlformats.org/officeDocument/2006/relationships" xmlns:p="http://schemas.openxmlformats.org/presentationml/2006/main">
+  <p:cSld>
+    <p:spTree>
+      <p:nvGrpSpPr>
+        <p:cNvPr id="1" name=""/>
+        <p:cNvGrpSpPr/>
+        <p:nvPr/>
+      </p:nvGrpSpPr>
+      <p:grpSpPr>
+        <a:xfrm>
+          <a:off x="0" y="0"/>
+          <a:ext cx="0" cy="0"/>
+          <a:chOff x="0" y="0"/>
+          <a:chExt cx="0" cy="0"/>
+        </a:xfrm>
+      </p:grpSpPr>
+      <p:sp>
+        <p:nvSpPr>
+          <p:cNvPr id="2" name="Slide Image Placeholder 1"/>
+          <p:cNvSpPr>
+            <a:spLocks noGrp="1" noRot="1" noChangeAspect="1"/>
+          </p:cNvSpPr>
+          <p:nvPr>
+            <p:ph type="sldImg"/>
+          </p:nvPr>
+        </p:nvSpPr>
+        <p:spPr/>
+      </p:sp>
+      <p:sp>
+        <p:nvSpPr>
+          <p:cNvPr id="3" name="Notes Placeholder 2"/>
+          <p:cNvSpPr>
+            <a:spLocks noGrp="1"/>
+          </p:cNvSpPr>
+          <p:nvPr>
+            <p:ph type="body" idx="1"/>
+          </p:nvPr>
+        </p:nvSpPr>
+        <p:spPr/>
+        <p:txBody>
+          <a:bodyPr/>
+          <a:lstStyle/>
+          <a:p>
+            <a:pPr marL="171450" indent="-171450">
+              <a:buFont typeface="Arial" panose="020B0604020202020204" pitchFamily="34" charset="0"/>
+              <a:buChar char="•"/>
+            </a:pPr>
+            <a:r>
+              <a:rPr lang="en-US" dirty="0"/>
+              <a:t>Incident ID is not in the data</a:t>
+            </a:r>
+          </a:p>
+          <a:p>
+            <a:pPr marL="171450" indent="-171450">
+              <a:buFont typeface="Arial" panose="020B0604020202020204" pitchFamily="34" charset="0"/>
+              <a:buChar char="•"/>
+            </a:pPr>
+            <a:r>
+              <a:rPr lang="en-US" dirty="0"/>
+              <a:t>Response number</a:t>
+            </a:r>
+          </a:p>
+          <a:p>
+            <a:pPr marL="628650" lvl="1" indent="-171450">
+              <a:buFont typeface="Arial" panose="020B0604020202020204" pitchFamily="34" charset="0"/>
+              <a:buChar char="•"/>
+            </a:pPr>
+            <a:r>
+              <a:rPr lang="en-US" dirty="0" err="1"/>
+              <a:t>ymd</a:t>
+            </a:r>
+            <a:r>
+              <a:rPr lang="en-US" dirty="0"/>
+              <a:t>###</a:t>
+            </a:r>
+          </a:p>
+          <a:p>
+            <a:pPr marL="628650" lvl="1" indent="-171450">
+              <a:buFont typeface="Arial" panose="020B0604020202020204" pitchFamily="34" charset="0"/>
+              <a:buChar char="•"/>
+            </a:pPr>
+            <a:r>
+              <a:rPr lang="en-US" dirty="0"/>
+              <a:t>Each response number is associated with a single person</a:t>
+            </a:r>
+          </a:p>
+          <a:p>
+            <a:pPr marL="628650" lvl="1" indent="-171450">
+              <a:buFont typeface="Arial" panose="020B0604020202020204" pitchFamily="34" charset="0"/>
+              <a:buChar char="•"/>
+            </a:pPr>
+            <a:r>
+              <a:rPr lang="en-US" dirty="0"/>
+              <a:t>A person who was treated by </a:t>
+            </a:r>
+            <a:r>
+              <a:rPr lang="en-US" dirty="0" err="1"/>
+              <a:t>MedStar</a:t>
+            </a:r>
+            <a:r>
+              <a:rPr lang="en-US" dirty="0"/>
+              <a:t> multiple times will have multiple response numbers. Therefore, response number does not necessarily uniquely identify a person.</a:t>
+            </a:r>
+          </a:p>
+          <a:p>
+            <a:pPr marL="628650" lvl="1" indent="-171450">
+              <a:buFont typeface="Arial" panose="020B0604020202020204" pitchFamily="34" charset="0"/>
+              <a:buChar char="•"/>
+            </a:pPr>
+            <a:r>
+              <a:rPr lang="en-US" dirty="0"/>
+              <a:t>Response number does uniquely identify a person/incident combination</a:t>
+            </a:r>
+          </a:p>
+          <a:p>
+            <a:pPr marL="628650" lvl="1" indent="-171450">
+              <a:buFont typeface="Arial" panose="020B0604020202020204" pitchFamily="34" charset="0"/>
+              <a:buChar char="•"/>
+            </a:pPr>
+            <a:r>
+              <a:rPr lang="en-US" dirty="0"/>
+              <a:t>There cannot be more than one DETECT screening input into the </a:t>
+            </a:r>
+            <a:r>
+              <a:rPr lang="en-US" dirty="0" err="1"/>
+              <a:t>ePCR</a:t>
+            </a:r>
+            <a:r>
+              <a:rPr lang="en-US" dirty="0"/>
+              <a:t> for a given person/incident (response number)</a:t>
+            </a:r>
+          </a:p>
+          <a:p>
+            <a:pPr marL="628650" lvl="1" indent="-171450">
+              <a:buFont typeface="Arial" panose="020B0604020202020204" pitchFamily="34" charset="0"/>
+              <a:buChar char="•"/>
+            </a:pPr>
+            <a:r>
+              <a:rPr lang="en-US" dirty="0"/>
+              <a:t>Therefore response number should uniquely identify a DETECT screening.</a:t>
+            </a:r>
+          </a:p>
+          <a:p>
+            <a:pPr marL="628650" lvl="1" indent="-171450">
+              <a:buFont typeface="Arial" panose="020B0604020202020204" pitchFamily="34" charset="0"/>
+              <a:buChar char="•"/>
+            </a:pPr>
+            <a:r>
+              <a:rPr lang="en-US" dirty="0"/>
+              <a:t>Check for multiple rows with the </a:t>
+            </a:r>
+            <a:r>
+              <a:rPr lang="en-US"/>
+              <a:t>same response number.</a:t>
+            </a:r>
+            <a:endParaRPr lang="en-US" dirty="0"/>
+          </a:p>
+        </p:txBody>
+      </p:sp>
+      <p:sp>
+        <p:nvSpPr>
+          <p:cNvPr id="4" name="Slide Number Placeholder 3"/>
+          <p:cNvSpPr>
+            <a:spLocks noGrp="1"/>
+          </p:cNvSpPr>
+          <p:nvPr>
+            <p:ph type="sldNum" sz="quarter" idx="10"/>
+          </p:nvPr>
+        </p:nvSpPr>
+        <p:spPr/>
+        <p:txBody>
+          <a:bodyPr/>
+          <a:lstStyle/>
+          <a:p>
+            <a:fld id="{36CF411A-600F-FC49-9C41-9076F6F2B99C}" type="slidenum">
+              <a:rPr lang="en-US" smtClean="0"/>
+              <a:t>3</a:t>
+            </a:fld>
+            <a:endParaRPr lang="en-US"/>
+          </a:p>
+        </p:txBody>
+      </p:sp>
+    </p:spTree>
+    <p:extLst>
+      <p:ext uri="{BB962C8B-B14F-4D97-AF65-F5344CB8AC3E}">
+        <p14:creationId xmlns:p14="http://schemas.microsoft.com/office/powerpoint/2010/main" val="4279429254"/>
+      </p:ext>
+    </p:extLst>
+  </p:cSld>
+  <p:clrMapOvr>
+    <a:masterClrMapping/>
+  </p:clrMapOvr>
+</p:notes>
+</file>
+
 <file path=ppt/slideLayouts/slideLayout1.xml><?xml version="1.0" encoding="utf-8"?>
 <p:sldLayout xmlns:a="http://schemas.openxmlformats.org/drawingml/2006/main" xmlns:r="http://schemas.openxmlformats.org/officeDocument/2006/relationships" xmlns:p="http://schemas.openxmlformats.org/presentationml/2006/main" type="title" preserve="1">
   <p:cSld name="Title Slide">
@@ -696,7 +893,7 @@
           <a:p>
             <a:fld id="{D4835627-BE63-6D44-A8D4-6AB599939C0A}" type="datetimeFigureOut">
               <a:rPr lang="en-US" smtClean="0"/>
-              <a:t>1/28/18</a:t>
+              <a:t>3/16/18</a:t>
             </a:fld>
             <a:endParaRPr lang="en-US"/>
           </a:p>
@@ -894,7 +1091,7 @@
           <a:p>
             <a:fld id="{D4835627-BE63-6D44-A8D4-6AB599939C0A}" type="datetimeFigureOut">
               <a:rPr lang="en-US" smtClean="0"/>
-              <a:t>1/28/18</a:t>
+              <a:t>3/16/18</a:t>
             </a:fld>
             <a:endParaRPr lang="en-US"/>
           </a:p>
@@ -1102,7 +1299,7 @@
           <a:p>
             <a:fld id="{D4835627-BE63-6D44-A8D4-6AB599939C0A}" type="datetimeFigureOut">
               <a:rPr lang="en-US" smtClean="0"/>
-              <a:t>1/28/18</a:t>
+              <a:t>3/16/18</a:t>
             </a:fld>
             <a:endParaRPr lang="en-US"/>
           </a:p>
@@ -1300,7 +1497,7 @@
           <a:p>
             <a:fld id="{D4835627-BE63-6D44-A8D4-6AB599939C0A}" type="datetimeFigureOut">
               <a:rPr lang="en-US" smtClean="0"/>
-              <a:t>1/28/18</a:t>
+              <a:t>3/16/18</a:t>
             </a:fld>
             <a:endParaRPr lang="en-US"/>
           </a:p>
@@ -1575,7 +1772,7 @@
           <a:p>
             <a:fld id="{D4835627-BE63-6D44-A8D4-6AB599939C0A}" type="datetimeFigureOut">
               <a:rPr lang="en-US" smtClean="0"/>
-              <a:t>1/28/18</a:t>
+              <a:t>3/16/18</a:t>
             </a:fld>
             <a:endParaRPr lang="en-US"/>
           </a:p>
@@ -1840,7 +2037,7 @@
           <a:p>
             <a:fld id="{D4835627-BE63-6D44-A8D4-6AB599939C0A}" type="datetimeFigureOut">
               <a:rPr lang="en-US" smtClean="0"/>
-              <a:t>1/28/18</a:t>
+              <a:t>3/16/18</a:t>
             </a:fld>
             <a:endParaRPr lang="en-US"/>
           </a:p>
@@ -2252,7 +2449,7 @@
           <a:p>
             <a:fld id="{D4835627-BE63-6D44-A8D4-6AB599939C0A}" type="datetimeFigureOut">
               <a:rPr lang="en-US" smtClean="0"/>
-              <a:t>1/28/18</a:t>
+              <a:t>3/16/18</a:t>
             </a:fld>
             <a:endParaRPr lang="en-US"/>
           </a:p>
@@ -2393,7 +2590,7 @@
           <a:p>
             <a:fld id="{D4835627-BE63-6D44-A8D4-6AB599939C0A}" type="datetimeFigureOut">
               <a:rPr lang="en-US" smtClean="0"/>
-              <a:t>1/28/18</a:t>
+              <a:t>3/16/18</a:t>
             </a:fld>
             <a:endParaRPr lang="en-US"/>
           </a:p>
@@ -2506,7 +2703,7 @@
           <a:p>
             <a:fld id="{D4835627-BE63-6D44-A8D4-6AB599939C0A}" type="datetimeFigureOut">
               <a:rPr lang="en-US" smtClean="0"/>
-              <a:t>1/28/18</a:t>
+              <a:t>3/16/18</a:t>
             </a:fld>
             <a:endParaRPr lang="en-US"/>
           </a:p>
@@ -2817,7 +3014,7 @@
           <a:p>
             <a:fld id="{D4835627-BE63-6D44-A8D4-6AB599939C0A}" type="datetimeFigureOut">
               <a:rPr lang="en-US" smtClean="0"/>
-              <a:t>1/28/18</a:t>
+              <a:t>3/16/18</a:t>
             </a:fld>
             <a:endParaRPr lang="en-US"/>
           </a:p>
@@ -3105,7 +3302,7 @@
           <a:p>
             <a:fld id="{D4835627-BE63-6D44-A8D4-6AB599939C0A}" type="datetimeFigureOut">
               <a:rPr lang="en-US" smtClean="0"/>
-              <a:t>1/28/18</a:t>
+              <a:t>3/16/18</a:t>
             </a:fld>
             <a:endParaRPr lang="en-US"/>
           </a:p>
@@ -3346,7 +3543,7 @@
           <a:p>
             <a:fld id="{D4835627-BE63-6D44-A8D4-6AB599939C0A}" type="datetimeFigureOut">
               <a:rPr lang="en-US" smtClean="0"/>
-              <a:t>1/28/18</a:t>
+              <a:t>3/16/18</a:t>
             </a:fld>
             <a:endParaRPr lang="en-US"/>
           </a:p>
@@ -4621,6 +4818,684 @@
     <p:extLst>
       <p:ext uri="{BB962C8B-B14F-4D97-AF65-F5344CB8AC3E}">
         <p14:creationId xmlns:p14="http://schemas.microsoft.com/office/powerpoint/2010/main" val="2671798362"/>
+      </p:ext>
+    </p:extLst>
+  </p:cSld>
+  <p:clrMapOvr>
+    <a:masterClrMapping/>
+  </p:clrMapOvr>
+</p:sld>
+</file>
+
+<file path=ppt/slides/slide3.xml><?xml version="1.0" encoding="utf-8"?>
+<p:sld xmlns:a="http://schemas.openxmlformats.org/drawingml/2006/main" xmlns:r="http://schemas.openxmlformats.org/officeDocument/2006/relationships" xmlns:p="http://schemas.openxmlformats.org/presentationml/2006/main">
+  <p:cSld>
+    <p:spTree>
+      <p:nvGrpSpPr>
+        <p:cNvPr id="1" name=""/>
+        <p:cNvGrpSpPr/>
+        <p:nvPr/>
+      </p:nvGrpSpPr>
+      <p:grpSpPr>
+        <a:xfrm>
+          <a:off x="0" y="0"/>
+          <a:ext cx="0" cy="0"/>
+          <a:chOff x="0" y="0"/>
+          <a:chExt cx="0" cy="0"/>
+        </a:xfrm>
+      </p:grpSpPr>
+      <p:sp>
+        <p:nvSpPr>
+          <p:cNvPr id="2" name="TextBox 1">
+            <a:extLst>
+              <a:ext uri="{FF2B5EF4-FFF2-40B4-BE49-F238E27FC236}">
+                <a16:creationId xmlns:a16="http://schemas.microsoft.com/office/drawing/2014/main" id="{B3E35D0C-F7CD-0F43-828D-5A2D70017160}"/>
+              </a:ext>
+            </a:extLst>
+          </p:cNvPr>
+          <p:cNvSpPr txBox="1"/>
+          <p:nvPr/>
+        </p:nvSpPr>
+        <p:spPr>
+          <a:xfrm>
+            <a:off x="226031" y="113016"/>
+            <a:ext cx="2527443" cy="369332"/>
+          </a:xfrm>
+          <a:prstGeom prst="rect">
+            <a:avLst/>
+          </a:prstGeom>
+          <a:noFill/>
+        </p:spPr>
+        <p:txBody>
+          <a:bodyPr wrap="square" rtlCol="0">
+            <a:spAutoFit/>
+          </a:bodyPr>
+          <a:lstStyle/>
+          <a:p>
+            <a:r>
+              <a:rPr lang="en-US" dirty="0" err="1"/>
+              <a:t>MedStar</a:t>
+            </a:r>
+            <a:r>
+              <a:rPr lang="en-US" dirty="0"/>
+              <a:t> DETECT Data</a:t>
+            </a:r>
+          </a:p>
+        </p:txBody>
+      </p:sp>
+      <p:sp>
+        <p:nvSpPr>
+          <p:cNvPr id="3" name="Rectangle 2">
+            <a:extLst>
+              <a:ext uri="{FF2B5EF4-FFF2-40B4-BE49-F238E27FC236}">
+                <a16:creationId xmlns:a16="http://schemas.microsoft.com/office/drawing/2014/main" id="{CC0A54E9-EBE4-394E-AC3E-DF0C43744EB2}"/>
+              </a:ext>
+            </a:extLst>
+          </p:cNvPr>
+          <p:cNvSpPr/>
+          <p:nvPr/>
+        </p:nvSpPr>
+        <p:spPr>
+          <a:xfrm>
+            <a:off x="4633647" y="921249"/>
+            <a:ext cx="1469205" cy="924674"/>
+          </a:xfrm>
+          <a:prstGeom prst="rect">
+            <a:avLst/>
+          </a:prstGeom>
+        </p:spPr>
+        <p:style>
+          <a:lnRef idx="2">
+            <a:schemeClr val="dk1"/>
+          </a:lnRef>
+          <a:fillRef idx="1">
+            <a:schemeClr val="lt1"/>
+          </a:fillRef>
+          <a:effectRef idx="0">
+            <a:schemeClr val="dk1"/>
+          </a:effectRef>
+          <a:fontRef idx="minor">
+            <a:schemeClr val="dk1"/>
+          </a:fontRef>
+        </p:style>
+        <p:txBody>
+          <a:bodyPr rtlCol="0" anchor="ctr"/>
+          <a:lstStyle/>
+          <a:p>
+            <a:pPr algn="ctr"/>
+            <a:r>
+              <a:rPr lang="en-US" dirty="0"/>
+              <a:t>Response 01</a:t>
+            </a:r>
+          </a:p>
+          <a:p>
+            <a:pPr algn="ctr"/>
+            <a:r>
+              <a:rPr lang="en-US" dirty="0"/>
+              <a:t>Mary Smith</a:t>
+            </a:r>
+          </a:p>
+        </p:txBody>
+      </p:sp>
+      <p:sp>
+        <p:nvSpPr>
+          <p:cNvPr id="4" name="Rectangle 3">
+            <a:extLst>
+              <a:ext uri="{FF2B5EF4-FFF2-40B4-BE49-F238E27FC236}">
+                <a16:creationId xmlns:a16="http://schemas.microsoft.com/office/drawing/2014/main" id="{8670074E-19EB-8444-B966-96CA64E086FA}"/>
+              </a:ext>
+            </a:extLst>
+          </p:cNvPr>
+          <p:cNvSpPr/>
+          <p:nvPr/>
+        </p:nvSpPr>
+        <p:spPr>
+          <a:xfrm>
+            <a:off x="226031" y="563367"/>
+            <a:ext cx="1469205" cy="924674"/>
+          </a:xfrm>
+          <a:prstGeom prst="rect">
+            <a:avLst/>
+          </a:prstGeom>
+        </p:spPr>
+        <p:style>
+          <a:lnRef idx="2">
+            <a:schemeClr val="dk1"/>
+          </a:lnRef>
+          <a:fillRef idx="1">
+            <a:schemeClr val="lt1"/>
+          </a:fillRef>
+          <a:effectRef idx="0">
+            <a:schemeClr val="dk1"/>
+          </a:effectRef>
+          <a:fontRef idx="minor">
+            <a:schemeClr val="dk1"/>
+          </a:fontRef>
+        </p:style>
+        <p:txBody>
+          <a:bodyPr rtlCol="0" anchor="ctr"/>
+          <a:lstStyle/>
+          <a:p>
+            <a:pPr algn="ctr"/>
+            <a:r>
+              <a:rPr lang="en-US" dirty="0"/>
+              <a:t>911 Call</a:t>
+            </a:r>
+          </a:p>
+        </p:txBody>
+      </p:sp>
+      <p:sp>
+        <p:nvSpPr>
+          <p:cNvPr id="5" name="Rectangle 4">
+            <a:extLst>
+              <a:ext uri="{FF2B5EF4-FFF2-40B4-BE49-F238E27FC236}">
+                <a16:creationId xmlns:a16="http://schemas.microsoft.com/office/drawing/2014/main" id="{9AF81C9C-F727-0B49-AE42-06AB76B5C834}"/>
+              </a:ext>
+            </a:extLst>
+          </p:cNvPr>
+          <p:cNvSpPr/>
+          <p:nvPr/>
+        </p:nvSpPr>
+        <p:spPr>
+          <a:xfrm>
+            <a:off x="2429839" y="1845923"/>
+            <a:ext cx="1469205" cy="924674"/>
+          </a:xfrm>
+          <a:prstGeom prst="rect">
+            <a:avLst/>
+          </a:prstGeom>
+        </p:spPr>
+        <p:style>
+          <a:lnRef idx="2">
+            <a:schemeClr val="dk1"/>
+          </a:lnRef>
+          <a:fillRef idx="1">
+            <a:schemeClr val="lt1"/>
+          </a:fillRef>
+          <a:effectRef idx="0">
+            <a:schemeClr val="dk1"/>
+          </a:effectRef>
+          <a:fontRef idx="minor">
+            <a:schemeClr val="dk1"/>
+          </a:fontRef>
+        </p:style>
+        <p:txBody>
+          <a:bodyPr rtlCol="0" anchor="ctr"/>
+          <a:lstStyle/>
+          <a:p>
+            <a:pPr algn="ctr"/>
+            <a:r>
+              <a:rPr lang="en-US" dirty="0"/>
+              <a:t>Incident 001</a:t>
+            </a:r>
+          </a:p>
+        </p:txBody>
+      </p:sp>
+      <p:sp>
+        <p:nvSpPr>
+          <p:cNvPr id="6" name="Rectangle 5">
+            <a:extLst>
+              <a:ext uri="{FF2B5EF4-FFF2-40B4-BE49-F238E27FC236}">
+                <a16:creationId xmlns:a16="http://schemas.microsoft.com/office/drawing/2014/main" id="{BF7F0FBC-C12D-C848-9472-E09020D7BAB4}"/>
+              </a:ext>
+            </a:extLst>
+          </p:cNvPr>
+          <p:cNvSpPr/>
+          <p:nvPr/>
+        </p:nvSpPr>
+        <p:spPr>
+          <a:xfrm>
+            <a:off x="226031" y="1845923"/>
+            <a:ext cx="1469205" cy="924674"/>
+          </a:xfrm>
+          <a:prstGeom prst="rect">
+            <a:avLst/>
+          </a:prstGeom>
+        </p:spPr>
+        <p:style>
+          <a:lnRef idx="2">
+            <a:schemeClr val="dk1"/>
+          </a:lnRef>
+          <a:fillRef idx="1">
+            <a:schemeClr val="lt1"/>
+          </a:fillRef>
+          <a:effectRef idx="0">
+            <a:schemeClr val="dk1"/>
+          </a:effectRef>
+          <a:fontRef idx="minor">
+            <a:schemeClr val="dk1"/>
+          </a:fontRef>
+        </p:style>
+        <p:txBody>
+          <a:bodyPr rtlCol="0" anchor="ctr"/>
+          <a:lstStyle/>
+          <a:p>
+            <a:pPr algn="ctr"/>
+            <a:r>
+              <a:rPr lang="en-US" dirty="0"/>
+              <a:t>Ambulance 1</a:t>
+            </a:r>
+          </a:p>
+        </p:txBody>
+      </p:sp>
+      <p:cxnSp>
+        <p:nvCxnSpPr>
+          <p:cNvPr id="8" name="Straight Arrow Connector 7">
+            <a:extLst>
+              <a:ext uri="{FF2B5EF4-FFF2-40B4-BE49-F238E27FC236}">
+                <a16:creationId xmlns:a16="http://schemas.microsoft.com/office/drawing/2014/main" id="{ED12CF4A-C3EB-F947-AB79-718D81846B45}"/>
+              </a:ext>
+            </a:extLst>
+          </p:cNvPr>
+          <p:cNvCxnSpPr>
+            <a:stCxn id="4" idx="2"/>
+            <a:endCxn id="6" idx="0"/>
+          </p:cNvCxnSpPr>
+          <p:nvPr/>
+        </p:nvCxnSpPr>
+        <p:spPr>
+          <a:xfrm>
+            <a:off x="960634" y="1488041"/>
+            <a:ext cx="0" cy="357882"/>
+          </a:xfrm>
+          <a:prstGeom prst="straightConnector1">
+            <a:avLst/>
+          </a:prstGeom>
+          <a:ln>
+            <a:tailEnd type="triangle"/>
+          </a:ln>
+        </p:spPr>
+        <p:style>
+          <a:lnRef idx="1">
+            <a:schemeClr val="accent1"/>
+          </a:lnRef>
+          <a:fillRef idx="0">
+            <a:schemeClr val="accent1"/>
+          </a:fillRef>
+          <a:effectRef idx="0">
+            <a:schemeClr val="accent1"/>
+          </a:effectRef>
+          <a:fontRef idx="minor">
+            <a:schemeClr val="tx1"/>
+          </a:fontRef>
+        </p:style>
+      </p:cxnSp>
+      <p:cxnSp>
+        <p:nvCxnSpPr>
+          <p:cNvPr id="10" name="Straight Arrow Connector 9">
+            <a:extLst>
+              <a:ext uri="{FF2B5EF4-FFF2-40B4-BE49-F238E27FC236}">
+                <a16:creationId xmlns:a16="http://schemas.microsoft.com/office/drawing/2014/main" id="{2A7EC17F-58A4-124E-9D3C-6209AC4F38B3}"/>
+              </a:ext>
+            </a:extLst>
+          </p:cNvPr>
+          <p:cNvCxnSpPr>
+            <a:stCxn id="6" idx="3"/>
+            <a:endCxn id="5" idx="1"/>
+          </p:cNvCxnSpPr>
+          <p:nvPr/>
+        </p:nvCxnSpPr>
+        <p:spPr>
+          <a:xfrm>
+            <a:off x="1695236" y="2308260"/>
+            <a:ext cx="734603" cy="0"/>
+          </a:xfrm>
+          <a:prstGeom prst="straightConnector1">
+            <a:avLst/>
+          </a:prstGeom>
+          <a:ln>
+            <a:tailEnd type="triangle"/>
+          </a:ln>
+        </p:spPr>
+        <p:style>
+          <a:lnRef idx="1">
+            <a:schemeClr val="accent1"/>
+          </a:lnRef>
+          <a:fillRef idx="0">
+            <a:schemeClr val="accent1"/>
+          </a:fillRef>
+          <a:effectRef idx="0">
+            <a:schemeClr val="accent1"/>
+          </a:effectRef>
+          <a:fontRef idx="minor">
+            <a:schemeClr val="tx1"/>
+          </a:fontRef>
+        </p:style>
+      </p:cxnSp>
+      <p:sp>
+        <p:nvSpPr>
+          <p:cNvPr id="11" name="Rectangle 10">
+            <a:extLst>
+              <a:ext uri="{FF2B5EF4-FFF2-40B4-BE49-F238E27FC236}">
+                <a16:creationId xmlns:a16="http://schemas.microsoft.com/office/drawing/2014/main" id="{333C45C3-C085-4248-B373-684F2FB150AC}"/>
+              </a:ext>
+            </a:extLst>
+          </p:cNvPr>
+          <p:cNvSpPr/>
+          <p:nvPr/>
+        </p:nvSpPr>
+        <p:spPr>
+          <a:xfrm>
+            <a:off x="4633647" y="2770597"/>
+            <a:ext cx="1469205" cy="924674"/>
+          </a:xfrm>
+          <a:prstGeom prst="rect">
+            <a:avLst/>
+          </a:prstGeom>
+        </p:spPr>
+        <p:style>
+          <a:lnRef idx="2">
+            <a:schemeClr val="dk1"/>
+          </a:lnRef>
+          <a:fillRef idx="1">
+            <a:schemeClr val="lt1"/>
+          </a:fillRef>
+          <a:effectRef idx="0">
+            <a:schemeClr val="dk1"/>
+          </a:effectRef>
+          <a:fontRef idx="minor">
+            <a:schemeClr val="dk1"/>
+          </a:fontRef>
+        </p:style>
+        <p:txBody>
+          <a:bodyPr rtlCol="0" anchor="ctr"/>
+          <a:lstStyle/>
+          <a:p>
+            <a:pPr algn="ctr"/>
+            <a:r>
+              <a:rPr lang="en-US" dirty="0"/>
+              <a:t>Response 02</a:t>
+            </a:r>
+          </a:p>
+          <a:p>
+            <a:pPr algn="ctr"/>
+            <a:r>
+              <a:rPr lang="en-US" dirty="0"/>
+              <a:t>John Smith</a:t>
+            </a:r>
+          </a:p>
+        </p:txBody>
+      </p:sp>
+      <p:cxnSp>
+        <p:nvCxnSpPr>
+          <p:cNvPr id="13" name="Elbow Connector 12">
+            <a:extLst>
+              <a:ext uri="{FF2B5EF4-FFF2-40B4-BE49-F238E27FC236}">
+                <a16:creationId xmlns:a16="http://schemas.microsoft.com/office/drawing/2014/main" id="{44BAB77F-E4D0-3146-89E1-365582A89369}"/>
+              </a:ext>
+            </a:extLst>
+          </p:cNvPr>
+          <p:cNvCxnSpPr>
+            <a:stCxn id="5" idx="3"/>
+            <a:endCxn id="3" idx="1"/>
+          </p:cNvCxnSpPr>
+          <p:nvPr/>
+        </p:nvCxnSpPr>
+        <p:spPr>
+          <a:xfrm flipV="1">
+            <a:off x="3899044" y="1383586"/>
+            <a:ext cx="734603" cy="924674"/>
+          </a:xfrm>
+          <a:prstGeom prst="bentConnector3">
+            <a:avLst/>
+          </a:prstGeom>
+          <a:ln>
+            <a:tailEnd type="triangle"/>
+          </a:ln>
+        </p:spPr>
+        <p:style>
+          <a:lnRef idx="1">
+            <a:schemeClr val="accent1"/>
+          </a:lnRef>
+          <a:fillRef idx="0">
+            <a:schemeClr val="accent1"/>
+          </a:fillRef>
+          <a:effectRef idx="0">
+            <a:schemeClr val="accent1"/>
+          </a:effectRef>
+          <a:fontRef idx="minor">
+            <a:schemeClr val="tx1"/>
+          </a:fontRef>
+        </p:style>
+      </p:cxnSp>
+      <p:cxnSp>
+        <p:nvCxnSpPr>
+          <p:cNvPr id="17" name="Elbow Connector 16">
+            <a:extLst>
+              <a:ext uri="{FF2B5EF4-FFF2-40B4-BE49-F238E27FC236}">
+                <a16:creationId xmlns:a16="http://schemas.microsoft.com/office/drawing/2014/main" id="{D2686D94-851A-F642-82A4-845DEC4D088C}"/>
+              </a:ext>
+            </a:extLst>
+          </p:cNvPr>
+          <p:cNvCxnSpPr>
+            <a:stCxn id="5" idx="3"/>
+            <a:endCxn id="11" idx="1"/>
+          </p:cNvCxnSpPr>
+          <p:nvPr/>
+        </p:nvCxnSpPr>
+        <p:spPr>
+          <a:xfrm>
+            <a:off x="3899044" y="2308260"/>
+            <a:ext cx="734603" cy="924674"/>
+          </a:xfrm>
+          <a:prstGeom prst="bentConnector3">
+            <a:avLst/>
+          </a:prstGeom>
+          <a:ln>
+            <a:tailEnd type="triangle"/>
+          </a:ln>
+        </p:spPr>
+        <p:style>
+          <a:lnRef idx="1">
+            <a:schemeClr val="accent1"/>
+          </a:lnRef>
+          <a:fillRef idx="0">
+            <a:schemeClr val="accent1"/>
+          </a:fillRef>
+          <a:effectRef idx="0">
+            <a:schemeClr val="accent1"/>
+          </a:effectRef>
+          <a:fontRef idx="minor">
+            <a:schemeClr val="tx1"/>
+          </a:fontRef>
+        </p:style>
+      </p:cxnSp>
+      <p:sp>
+        <p:nvSpPr>
+          <p:cNvPr id="18" name="Rectangle 17">
+            <a:extLst>
+              <a:ext uri="{FF2B5EF4-FFF2-40B4-BE49-F238E27FC236}">
+                <a16:creationId xmlns:a16="http://schemas.microsoft.com/office/drawing/2014/main" id="{1D4D9E38-6D5C-1543-B24A-C41D1169B54C}"/>
+              </a:ext>
+            </a:extLst>
+          </p:cNvPr>
+          <p:cNvSpPr/>
+          <p:nvPr/>
+        </p:nvSpPr>
+        <p:spPr>
+          <a:xfrm>
+            <a:off x="6707612" y="921249"/>
+            <a:ext cx="1469205" cy="924674"/>
+          </a:xfrm>
+          <a:prstGeom prst="rect">
+            <a:avLst/>
+          </a:prstGeom>
+        </p:spPr>
+        <p:style>
+          <a:lnRef idx="2">
+            <a:schemeClr val="dk1"/>
+          </a:lnRef>
+          <a:fillRef idx="1">
+            <a:schemeClr val="lt1"/>
+          </a:fillRef>
+          <a:effectRef idx="0">
+            <a:schemeClr val="dk1"/>
+          </a:effectRef>
+          <a:fontRef idx="minor">
+            <a:schemeClr val="dk1"/>
+          </a:fontRef>
+        </p:style>
+        <p:txBody>
+          <a:bodyPr rtlCol="0" anchor="ctr"/>
+          <a:lstStyle/>
+          <a:p>
+            <a:pPr algn="ctr"/>
+            <a:r>
+              <a:rPr lang="en-US" dirty="0"/>
+              <a:t>DETECT Screen</a:t>
+            </a:r>
+          </a:p>
+          <a:p>
+            <a:pPr algn="ctr"/>
+            <a:r>
+              <a:rPr lang="en-US" dirty="0"/>
+              <a:t>Mary Smith</a:t>
+            </a:r>
+          </a:p>
+        </p:txBody>
+      </p:sp>
+      <p:sp>
+        <p:nvSpPr>
+          <p:cNvPr id="19" name="Rectangle 18">
+            <a:extLst>
+              <a:ext uri="{FF2B5EF4-FFF2-40B4-BE49-F238E27FC236}">
+                <a16:creationId xmlns:a16="http://schemas.microsoft.com/office/drawing/2014/main" id="{EAE16655-E5B7-3648-9557-47FB72E13404}"/>
+              </a:ext>
+            </a:extLst>
+          </p:cNvPr>
+          <p:cNvSpPr/>
+          <p:nvPr/>
+        </p:nvSpPr>
+        <p:spPr>
+          <a:xfrm>
+            <a:off x="6707612" y="2770597"/>
+            <a:ext cx="1469205" cy="924674"/>
+          </a:xfrm>
+          <a:prstGeom prst="rect">
+            <a:avLst/>
+          </a:prstGeom>
+        </p:spPr>
+        <p:style>
+          <a:lnRef idx="2">
+            <a:schemeClr val="dk1"/>
+          </a:lnRef>
+          <a:fillRef idx="1">
+            <a:schemeClr val="lt1"/>
+          </a:fillRef>
+          <a:effectRef idx="0">
+            <a:schemeClr val="dk1"/>
+          </a:effectRef>
+          <a:fontRef idx="minor">
+            <a:schemeClr val="dk1"/>
+          </a:fontRef>
+        </p:style>
+        <p:txBody>
+          <a:bodyPr rtlCol="0" anchor="ctr"/>
+          <a:lstStyle/>
+          <a:p>
+            <a:pPr algn="ctr"/>
+            <a:r>
+              <a:rPr lang="en-US" dirty="0"/>
+              <a:t>DETECT Screen</a:t>
+            </a:r>
+          </a:p>
+          <a:p>
+            <a:pPr algn="ctr"/>
+            <a:r>
+              <a:rPr lang="en-US" dirty="0"/>
+              <a:t>John Smith</a:t>
+            </a:r>
+          </a:p>
+        </p:txBody>
+      </p:sp>
+      <p:cxnSp>
+        <p:nvCxnSpPr>
+          <p:cNvPr id="21" name="Straight Arrow Connector 20">
+            <a:extLst>
+              <a:ext uri="{FF2B5EF4-FFF2-40B4-BE49-F238E27FC236}">
+                <a16:creationId xmlns:a16="http://schemas.microsoft.com/office/drawing/2014/main" id="{EC382C02-B1C8-6946-8C3D-14E6FAA020C1}"/>
+              </a:ext>
+            </a:extLst>
+          </p:cNvPr>
+          <p:cNvCxnSpPr>
+            <a:stCxn id="3" idx="3"/>
+            <a:endCxn id="18" idx="1"/>
+          </p:cNvCxnSpPr>
+          <p:nvPr/>
+        </p:nvCxnSpPr>
+        <p:spPr>
+          <a:xfrm>
+            <a:off x="6102852" y="1383586"/>
+            <a:ext cx="604760" cy="0"/>
+          </a:xfrm>
+          <a:prstGeom prst="straightConnector1">
+            <a:avLst/>
+          </a:prstGeom>
+          <a:ln>
+            <a:tailEnd type="triangle"/>
+          </a:ln>
+        </p:spPr>
+        <p:style>
+          <a:lnRef idx="1">
+            <a:schemeClr val="accent1"/>
+          </a:lnRef>
+          <a:fillRef idx="0">
+            <a:schemeClr val="accent1"/>
+          </a:fillRef>
+          <a:effectRef idx="0">
+            <a:schemeClr val="accent1"/>
+          </a:effectRef>
+          <a:fontRef idx="minor">
+            <a:schemeClr val="tx1"/>
+          </a:fontRef>
+        </p:style>
+      </p:cxnSp>
+      <p:cxnSp>
+        <p:nvCxnSpPr>
+          <p:cNvPr id="23" name="Straight Arrow Connector 22">
+            <a:extLst>
+              <a:ext uri="{FF2B5EF4-FFF2-40B4-BE49-F238E27FC236}">
+                <a16:creationId xmlns:a16="http://schemas.microsoft.com/office/drawing/2014/main" id="{80B7F7AF-A37A-3542-A71B-036998C99973}"/>
+              </a:ext>
+            </a:extLst>
+          </p:cNvPr>
+          <p:cNvCxnSpPr>
+            <a:stCxn id="11" idx="3"/>
+            <a:endCxn id="19" idx="1"/>
+          </p:cNvCxnSpPr>
+          <p:nvPr/>
+        </p:nvCxnSpPr>
+        <p:spPr>
+          <a:xfrm>
+            <a:off x="6102852" y="3232934"/>
+            <a:ext cx="604760" cy="0"/>
+          </a:xfrm>
+          <a:prstGeom prst="straightConnector1">
+            <a:avLst/>
+          </a:prstGeom>
+          <a:ln>
+            <a:tailEnd type="triangle"/>
+          </a:ln>
+        </p:spPr>
+        <p:style>
+          <a:lnRef idx="1">
+            <a:schemeClr val="accent1"/>
+          </a:lnRef>
+          <a:fillRef idx="0">
+            <a:schemeClr val="accent1"/>
+          </a:fillRef>
+          <a:effectRef idx="0">
+            <a:schemeClr val="accent1"/>
+          </a:effectRef>
+          <a:fontRef idx="minor">
+            <a:schemeClr val="tx1"/>
+          </a:fontRef>
+        </p:style>
+      </p:cxnSp>
+    </p:spTree>
+    <p:extLst>
+      <p:ext uri="{BB962C8B-B14F-4D97-AF65-F5344CB8AC3E}">
+        <p14:creationId xmlns:p14="http://schemas.microsoft.com/office/powerpoint/2010/main" val="3959532915"/>
       </p:ext>
     </p:extLst>
   </p:cSld>

</xml_diff>

<commit_message>
Figured out incident PCR numbers
It's important to understand the meaning of patient identification variables in the data, and the relationship between patient identification variables across both datasets. However, after manually checking the datasets we found that the terms "Incident" and "Response" are used inconsistently between files. We fixed the MedStar datasets so that incident PCR  number represents a unique incident/person combination.
</commit_message>
<xml_diff>
--- a/images/detect_pilot_graphics.pptx
+++ b/images/detect_pilot_graphics.pptx
@@ -5,12 +5,13 @@
     <p:sldMasterId id="2147483648" r:id="rId1"/>
   </p:sldMasterIdLst>
   <p:notesMasterIdLst>
-    <p:notesMasterId r:id="rId5"/>
+    <p:notesMasterId r:id="rId6"/>
   </p:notesMasterIdLst>
   <p:sldIdLst>
     <p:sldId id="256" r:id="rId2"/>
     <p:sldId id="258" r:id="rId3"/>
     <p:sldId id="259" r:id="rId4"/>
+    <p:sldId id="260" r:id="rId5"/>
   </p:sldIdLst>
   <p:sldSz cx="12192000" cy="6858000"/>
   <p:notesSz cx="6858000" cy="9144000"/>
@@ -199,7 +200,7 @@
           <a:p>
             <a:fld id="{100C7322-DBA3-BF43-82FB-6F78055E2C71}" type="datetimeFigureOut">
               <a:rPr lang="en-US" smtClean="0"/>
-              <a:t>3/16/18</a:t>
+              <a:t>3/17/18</a:t>
             </a:fld>
             <a:endParaRPr lang="en-US"/>
           </a:p>
@@ -598,114 +599,6 @@
               <a:buFont typeface="Arial" panose="020B0604020202020204" pitchFamily="34" charset="0"/>
               <a:buChar char="•"/>
             </a:pPr>
-            <a:r>
-              <a:rPr lang="en-US" dirty="0"/>
-              <a:t>Incident ID is not in the data</a:t>
-            </a:r>
-          </a:p>
-          <a:p>
-            <a:pPr marL="171450" indent="-171450">
-              <a:buFont typeface="Arial" panose="020B0604020202020204" pitchFamily="34" charset="0"/>
-              <a:buChar char="•"/>
-            </a:pPr>
-            <a:r>
-              <a:rPr lang="en-US" dirty="0"/>
-              <a:t>Response number</a:t>
-            </a:r>
-          </a:p>
-          <a:p>
-            <a:pPr marL="628650" lvl="1" indent="-171450">
-              <a:buFont typeface="Arial" panose="020B0604020202020204" pitchFamily="34" charset="0"/>
-              <a:buChar char="•"/>
-            </a:pPr>
-            <a:r>
-              <a:rPr lang="en-US" dirty="0" err="1"/>
-              <a:t>ymd</a:t>
-            </a:r>
-            <a:r>
-              <a:rPr lang="en-US" dirty="0"/>
-              <a:t>###</a:t>
-            </a:r>
-          </a:p>
-          <a:p>
-            <a:pPr marL="628650" lvl="1" indent="-171450">
-              <a:buFont typeface="Arial" panose="020B0604020202020204" pitchFamily="34" charset="0"/>
-              <a:buChar char="•"/>
-            </a:pPr>
-            <a:r>
-              <a:rPr lang="en-US" dirty="0"/>
-              <a:t>Each response number is associated with a single person</a:t>
-            </a:r>
-          </a:p>
-          <a:p>
-            <a:pPr marL="628650" lvl="1" indent="-171450">
-              <a:buFont typeface="Arial" panose="020B0604020202020204" pitchFamily="34" charset="0"/>
-              <a:buChar char="•"/>
-            </a:pPr>
-            <a:r>
-              <a:rPr lang="en-US" dirty="0"/>
-              <a:t>A person who was treated by </a:t>
-            </a:r>
-            <a:r>
-              <a:rPr lang="en-US" dirty="0" err="1"/>
-              <a:t>MedStar</a:t>
-            </a:r>
-            <a:r>
-              <a:rPr lang="en-US" dirty="0"/>
-              <a:t> multiple times will have multiple response numbers. Therefore, response number does not necessarily uniquely identify a person.</a:t>
-            </a:r>
-          </a:p>
-          <a:p>
-            <a:pPr marL="628650" lvl="1" indent="-171450">
-              <a:buFont typeface="Arial" panose="020B0604020202020204" pitchFamily="34" charset="0"/>
-              <a:buChar char="•"/>
-            </a:pPr>
-            <a:r>
-              <a:rPr lang="en-US" dirty="0"/>
-              <a:t>Response number does uniquely identify a person/incident combination</a:t>
-            </a:r>
-          </a:p>
-          <a:p>
-            <a:pPr marL="628650" lvl="1" indent="-171450">
-              <a:buFont typeface="Arial" panose="020B0604020202020204" pitchFamily="34" charset="0"/>
-              <a:buChar char="•"/>
-            </a:pPr>
-            <a:r>
-              <a:rPr lang="en-US" dirty="0"/>
-              <a:t>There cannot be more than one DETECT screening input into the </a:t>
-            </a:r>
-            <a:r>
-              <a:rPr lang="en-US" dirty="0" err="1"/>
-              <a:t>ePCR</a:t>
-            </a:r>
-            <a:r>
-              <a:rPr lang="en-US" dirty="0"/>
-              <a:t> for a given person/incident (response number)</a:t>
-            </a:r>
-          </a:p>
-          <a:p>
-            <a:pPr marL="628650" lvl="1" indent="-171450">
-              <a:buFont typeface="Arial" panose="020B0604020202020204" pitchFamily="34" charset="0"/>
-              <a:buChar char="•"/>
-            </a:pPr>
-            <a:r>
-              <a:rPr lang="en-US" dirty="0"/>
-              <a:t>Therefore response number should uniquely identify a DETECT screening.</a:t>
-            </a:r>
-          </a:p>
-          <a:p>
-            <a:pPr marL="628650" lvl="1" indent="-171450">
-              <a:buFont typeface="Arial" panose="020B0604020202020204" pitchFamily="34" charset="0"/>
-              <a:buChar char="•"/>
-            </a:pPr>
-            <a:r>
-              <a:rPr lang="en-US" dirty="0"/>
-              <a:t>Check for multiple rows with the </a:t>
-            </a:r>
-            <a:r>
-              <a:rPr lang="en-US"/>
-              <a:t>same response number.</a:t>
-            </a:r>
             <a:endParaRPr lang="en-US" dirty="0"/>
           </a:p>
         </p:txBody>
@@ -737,6 +630,104 @@
     <p:extLst>
       <p:ext uri="{BB962C8B-B14F-4D97-AF65-F5344CB8AC3E}">
         <p14:creationId xmlns:p14="http://schemas.microsoft.com/office/powerpoint/2010/main" val="4279429254"/>
+      </p:ext>
+    </p:extLst>
+  </p:cSld>
+  <p:clrMapOvr>
+    <a:masterClrMapping/>
+  </p:clrMapOvr>
+</p:notes>
+</file>
+
+<file path=ppt/notesSlides/notesSlide3.xml><?xml version="1.0" encoding="utf-8"?>
+<p:notes xmlns:a="http://schemas.openxmlformats.org/drawingml/2006/main" xmlns:r="http://schemas.openxmlformats.org/officeDocument/2006/relationships" xmlns:p="http://schemas.openxmlformats.org/presentationml/2006/main">
+  <p:cSld>
+    <p:spTree>
+      <p:nvGrpSpPr>
+        <p:cNvPr id="1" name=""/>
+        <p:cNvGrpSpPr/>
+        <p:nvPr/>
+      </p:nvGrpSpPr>
+      <p:grpSpPr>
+        <a:xfrm>
+          <a:off x="0" y="0"/>
+          <a:ext cx="0" cy="0"/>
+          <a:chOff x="0" y="0"/>
+          <a:chExt cx="0" cy="0"/>
+        </a:xfrm>
+      </p:grpSpPr>
+      <p:sp>
+        <p:nvSpPr>
+          <p:cNvPr id="2" name="Slide Image Placeholder 1"/>
+          <p:cNvSpPr>
+            <a:spLocks noGrp="1" noRot="1" noChangeAspect="1"/>
+          </p:cNvSpPr>
+          <p:nvPr>
+            <p:ph type="sldImg"/>
+          </p:nvPr>
+        </p:nvSpPr>
+        <p:spPr/>
+      </p:sp>
+      <p:sp>
+        <p:nvSpPr>
+          <p:cNvPr id="3" name="Notes Placeholder 2"/>
+          <p:cNvSpPr>
+            <a:spLocks noGrp="1"/>
+          </p:cNvSpPr>
+          <p:nvPr>
+            <p:ph type="body" idx="1"/>
+          </p:nvPr>
+        </p:nvSpPr>
+        <p:spPr/>
+        <p:txBody>
+          <a:bodyPr/>
+          <a:lstStyle/>
+          <a:p>
+            <a:pPr marL="171450" indent="-171450">
+              <a:buFont typeface="Arial" panose="020B0604020202020204" pitchFamily="34" charset="0"/>
+              <a:buChar char="•"/>
+            </a:pPr>
+            <a:r>
+              <a:rPr lang="en-US" dirty="0"/>
+              <a:t>APS Response</a:t>
+            </a:r>
+          </a:p>
+          <a:p>
+            <a:pPr marL="171450" indent="-171450">
+              <a:buFont typeface="Arial" panose="020B0604020202020204" pitchFamily="34" charset="0"/>
+              <a:buChar char="•"/>
+            </a:pPr>
+            <a:endParaRPr lang="en-US" dirty="0"/>
+          </a:p>
+        </p:txBody>
+      </p:sp>
+      <p:sp>
+        <p:nvSpPr>
+          <p:cNvPr id="4" name="Slide Number Placeholder 3"/>
+          <p:cNvSpPr>
+            <a:spLocks noGrp="1"/>
+          </p:cNvSpPr>
+          <p:nvPr>
+            <p:ph type="sldNum" sz="quarter" idx="10"/>
+          </p:nvPr>
+        </p:nvSpPr>
+        <p:spPr/>
+        <p:txBody>
+          <a:bodyPr/>
+          <a:lstStyle/>
+          <a:p>
+            <a:fld id="{36CF411A-600F-FC49-9C41-9076F6F2B99C}" type="slidenum">
+              <a:rPr lang="en-US" smtClean="0"/>
+              <a:t>4</a:t>
+            </a:fld>
+            <a:endParaRPr lang="en-US"/>
+          </a:p>
+        </p:txBody>
+      </p:sp>
+    </p:spTree>
+    <p:extLst>
+      <p:ext uri="{BB962C8B-B14F-4D97-AF65-F5344CB8AC3E}">
+        <p14:creationId xmlns:p14="http://schemas.microsoft.com/office/powerpoint/2010/main" val="3967404216"/>
       </p:ext>
     </p:extLst>
   </p:cSld>
@@ -893,7 +884,7 @@
           <a:p>
             <a:fld id="{D4835627-BE63-6D44-A8D4-6AB599939C0A}" type="datetimeFigureOut">
               <a:rPr lang="en-US" smtClean="0"/>
-              <a:t>3/16/18</a:t>
+              <a:t>3/17/18</a:t>
             </a:fld>
             <a:endParaRPr lang="en-US"/>
           </a:p>
@@ -1091,7 +1082,7 @@
           <a:p>
             <a:fld id="{D4835627-BE63-6D44-A8D4-6AB599939C0A}" type="datetimeFigureOut">
               <a:rPr lang="en-US" smtClean="0"/>
-              <a:t>3/16/18</a:t>
+              <a:t>3/17/18</a:t>
             </a:fld>
             <a:endParaRPr lang="en-US"/>
           </a:p>
@@ -1299,7 +1290,7 @@
           <a:p>
             <a:fld id="{D4835627-BE63-6D44-A8D4-6AB599939C0A}" type="datetimeFigureOut">
               <a:rPr lang="en-US" smtClean="0"/>
-              <a:t>3/16/18</a:t>
+              <a:t>3/17/18</a:t>
             </a:fld>
             <a:endParaRPr lang="en-US"/>
           </a:p>
@@ -1497,7 +1488,7 @@
           <a:p>
             <a:fld id="{D4835627-BE63-6D44-A8D4-6AB599939C0A}" type="datetimeFigureOut">
               <a:rPr lang="en-US" smtClean="0"/>
-              <a:t>3/16/18</a:t>
+              <a:t>3/17/18</a:t>
             </a:fld>
             <a:endParaRPr lang="en-US"/>
           </a:p>
@@ -1772,7 +1763,7 @@
           <a:p>
             <a:fld id="{D4835627-BE63-6D44-A8D4-6AB599939C0A}" type="datetimeFigureOut">
               <a:rPr lang="en-US" smtClean="0"/>
-              <a:t>3/16/18</a:t>
+              <a:t>3/17/18</a:t>
             </a:fld>
             <a:endParaRPr lang="en-US"/>
           </a:p>
@@ -2037,7 +2028,7 @@
           <a:p>
             <a:fld id="{D4835627-BE63-6D44-A8D4-6AB599939C0A}" type="datetimeFigureOut">
               <a:rPr lang="en-US" smtClean="0"/>
-              <a:t>3/16/18</a:t>
+              <a:t>3/17/18</a:t>
             </a:fld>
             <a:endParaRPr lang="en-US"/>
           </a:p>
@@ -2449,7 +2440,7 @@
           <a:p>
             <a:fld id="{D4835627-BE63-6D44-A8D4-6AB599939C0A}" type="datetimeFigureOut">
               <a:rPr lang="en-US" smtClean="0"/>
-              <a:t>3/16/18</a:t>
+              <a:t>3/17/18</a:t>
             </a:fld>
             <a:endParaRPr lang="en-US"/>
           </a:p>
@@ -2590,7 +2581,7 @@
           <a:p>
             <a:fld id="{D4835627-BE63-6D44-A8D4-6AB599939C0A}" type="datetimeFigureOut">
               <a:rPr lang="en-US" smtClean="0"/>
-              <a:t>3/16/18</a:t>
+              <a:t>3/17/18</a:t>
             </a:fld>
             <a:endParaRPr lang="en-US"/>
           </a:p>
@@ -2703,7 +2694,7 @@
           <a:p>
             <a:fld id="{D4835627-BE63-6D44-A8D4-6AB599939C0A}" type="datetimeFigureOut">
               <a:rPr lang="en-US" smtClean="0"/>
-              <a:t>3/16/18</a:t>
+              <a:t>3/17/18</a:t>
             </a:fld>
             <a:endParaRPr lang="en-US"/>
           </a:p>
@@ -3014,7 +3005,7 @@
           <a:p>
             <a:fld id="{D4835627-BE63-6D44-A8D4-6AB599939C0A}" type="datetimeFigureOut">
               <a:rPr lang="en-US" smtClean="0"/>
-              <a:t>3/16/18</a:t>
+              <a:t>3/17/18</a:t>
             </a:fld>
             <a:endParaRPr lang="en-US"/>
           </a:p>
@@ -3302,7 +3293,7 @@
           <a:p>
             <a:fld id="{D4835627-BE63-6D44-A8D4-6AB599939C0A}" type="datetimeFigureOut">
               <a:rPr lang="en-US" smtClean="0"/>
-              <a:t>3/16/18</a:t>
+              <a:t>3/17/18</a:t>
             </a:fld>
             <a:endParaRPr lang="en-US"/>
           </a:p>
@@ -3543,7 +3534,7 @@
           <a:p>
             <a:fld id="{D4835627-BE63-6D44-A8D4-6AB599939C0A}" type="datetimeFigureOut">
               <a:rPr lang="en-US" smtClean="0"/>
-              <a:t>3/16/18</a:t>
+              <a:t>3/17/18</a:t>
             </a:fld>
             <a:endParaRPr lang="en-US"/>
           </a:p>
@@ -4844,658 +4835,1273 @@
           <a:chExt cx="0" cy="0"/>
         </a:xfrm>
       </p:grpSpPr>
-      <p:sp>
-        <p:nvSpPr>
-          <p:cNvPr id="2" name="TextBox 1">
-            <a:extLst>
-              <a:ext uri="{FF2B5EF4-FFF2-40B4-BE49-F238E27FC236}">
-                <a16:creationId xmlns:a16="http://schemas.microsoft.com/office/drawing/2014/main" id="{B3E35D0C-F7CD-0F43-828D-5A2D70017160}"/>
-              </a:ext>
-            </a:extLst>
-          </p:cNvPr>
-          <p:cNvSpPr txBox="1"/>
+      <p:grpSp>
+        <p:nvGrpSpPr>
+          <p:cNvPr id="74" name="Group 73">
+            <a:extLst>
+              <a:ext uri="{FF2B5EF4-FFF2-40B4-BE49-F238E27FC236}">
+                <a16:creationId xmlns:a16="http://schemas.microsoft.com/office/drawing/2014/main" id="{3D98B498-29D7-6D48-8CBB-45F45CC6C9BA}"/>
+              </a:ext>
+            </a:extLst>
+          </p:cNvPr>
+          <p:cNvGrpSpPr/>
           <p:nvPr/>
-        </p:nvSpPr>
-        <p:spPr>
+        </p:nvGrpSpPr>
+        <p:grpSpPr>
           <a:xfrm>
-            <a:off x="226031" y="113016"/>
-            <a:ext cx="2527443" cy="369332"/>
+            <a:off x="196951" y="319663"/>
+            <a:ext cx="11798098" cy="6134032"/>
+            <a:chOff x="117416" y="717556"/>
+            <a:chExt cx="10585166" cy="5503408"/>
           </a:xfrm>
-          <a:prstGeom prst="rect">
-            <a:avLst/>
-          </a:prstGeom>
-          <a:noFill/>
-        </p:spPr>
-        <p:txBody>
-          <a:bodyPr wrap="square" rtlCol="0">
-            <a:spAutoFit/>
-          </a:bodyPr>
-          <a:lstStyle/>
-          <a:p>
-            <a:r>
-              <a:rPr lang="en-US" dirty="0" err="1"/>
-              <a:t>MedStar</a:t>
-            </a:r>
-            <a:r>
-              <a:rPr lang="en-US" dirty="0"/>
-              <a:t> DETECT Data</a:t>
-            </a:r>
-          </a:p>
-        </p:txBody>
-      </p:sp>
-      <p:sp>
-        <p:nvSpPr>
-          <p:cNvPr id="3" name="Rectangle 2">
-            <a:extLst>
-              <a:ext uri="{FF2B5EF4-FFF2-40B4-BE49-F238E27FC236}">
-                <a16:creationId xmlns:a16="http://schemas.microsoft.com/office/drawing/2014/main" id="{CC0A54E9-EBE4-394E-AC3E-DF0C43744EB2}"/>
-              </a:ext>
-            </a:extLst>
-          </p:cNvPr>
-          <p:cNvSpPr/>
-          <p:nvPr/>
-        </p:nvSpPr>
-        <p:spPr>
-          <a:xfrm>
-            <a:off x="4633647" y="921249"/>
-            <a:ext cx="1469205" cy="924674"/>
-          </a:xfrm>
-          <a:prstGeom prst="rect">
-            <a:avLst/>
-          </a:prstGeom>
-        </p:spPr>
-        <p:style>
-          <a:lnRef idx="2">
-            <a:schemeClr val="dk1"/>
-          </a:lnRef>
-          <a:fillRef idx="1">
-            <a:schemeClr val="lt1"/>
-          </a:fillRef>
-          <a:effectRef idx="0">
-            <a:schemeClr val="dk1"/>
-          </a:effectRef>
-          <a:fontRef idx="minor">
-            <a:schemeClr val="dk1"/>
-          </a:fontRef>
-        </p:style>
-        <p:txBody>
-          <a:bodyPr rtlCol="0" anchor="ctr"/>
-          <a:lstStyle/>
-          <a:p>
-            <a:pPr algn="ctr"/>
-            <a:r>
-              <a:rPr lang="en-US" dirty="0"/>
-              <a:t>Response 01</a:t>
-            </a:r>
-          </a:p>
-          <a:p>
-            <a:pPr algn="ctr"/>
-            <a:r>
-              <a:rPr lang="en-US" dirty="0"/>
-              <a:t>Mary Smith</a:t>
-            </a:r>
-          </a:p>
-        </p:txBody>
-      </p:sp>
-      <p:sp>
-        <p:nvSpPr>
-          <p:cNvPr id="4" name="Rectangle 3">
-            <a:extLst>
-              <a:ext uri="{FF2B5EF4-FFF2-40B4-BE49-F238E27FC236}">
-                <a16:creationId xmlns:a16="http://schemas.microsoft.com/office/drawing/2014/main" id="{8670074E-19EB-8444-B966-96CA64E086FA}"/>
-              </a:ext>
-            </a:extLst>
-          </p:cNvPr>
-          <p:cNvSpPr/>
-          <p:nvPr/>
-        </p:nvSpPr>
-        <p:spPr>
-          <a:xfrm>
-            <a:off x="226031" y="563367"/>
-            <a:ext cx="1469205" cy="924674"/>
-          </a:xfrm>
-          <a:prstGeom prst="rect">
-            <a:avLst/>
-          </a:prstGeom>
-        </p:spPr>
-        <p:style>
-          <a:lnRef idx="2">
-            <a:schemeClr val="dk1"/>
-          </a:lnRef>
-          <a:fillRef idx="1">
-            <a:schemeClr val="lt1"/>
-          </a:fillRef>
-          <a:effectRef idx="0">
-            <a:schemeClr val="dk1"/>
-          </a:effectRef>
-          <a:fontRef idx="minor">
-            <a:schemeClr val="dk1"/>
-          </a:fontRef>
-        </p:style>
-        <p:txBody>
-          <a:bodyPr rtlCol="0" anchor="ctr"/>
-          <a:lstStyle/>
-          <a:p>
-            <a:pPr algn="ctr"/>
-            <a:r>
-              <a:rPr lang="en-US" dirty="0"/>
-              <a:t>911 Call</a:t>
-            </a:r>
-          </a:p>
-        </p:txBody>
-      </p:sp>
-      <p:sp>
-        <p:nvSpPr>
-          <p:cNvPr id="5" name="Rectangle 4">
-            <a:extLst>
-              <a:ext uri="{FF2B5EF4-FFF2-40B4-BE49-F238E27FC236}">
-                <a16:creationId xmlns:a16="http://schemas.microsoft.com/office/drawing/2014/main" id="{9AF81C9C-F727-0B49-AE42-06AB76B5C834}"/>
-              </a:ext>
-            </a:extLst>
-          </p:cNvPr>
-          <p:cNvSpPr/>
-          <p:nvPr/>
-        </p:nvSpPr>
-        <p:spPr>
-          <a:xfrm>
-            <a:off x="2429839" y="1845923"/>
-            <a:ext cx="1469205" cy="924674"/>
-          </a:xfrm>
-          <a:prstGeom prst="rect">
-            <a:avLst/>
-          </a:prstGeom>
-        </p:spPr>
-        <p:style>
-          <a:lnRef idx="2">
-            <a:schemeClr val="dk1"/>
-          </a:lnRef>
-          <a:fillRef idx="1">
-            <a:schemeClr val="lt1"/>
-          </a:fillRef>
-          <a:effectRef idx="0">
-            <a:schemeClr val="dk1"/>
-          </a:effectRef>
-          <a:fontRef idx="minor">
-            <a:schemeClr val="dk1"/>
-          </a:fontRef>
-        </p:style>
-        <p:txBody>
-          <a:bodyPr rtlCol="0" anchor="ctr"/>
-          <a:lstStyle/>
-          <a:p>
-            <a:pPr algn="ctr"/>
-            <a:r>
-              <a:rPr lang="en-US" dirty="0"/>
-              <a:t>Incident 001</a:t>
-            </a:r>
-          </a:p>
-        </p:txBody>
-      </p:sp>
-      <p:sp>
-        <p:nvSpPr>
-          <p:cNvPr id="6" name="Rectangle 5">
-            <a:extLst>
-              <a:ext uri="{FF2B5EF4-FFF2-40B4-BE49-F238E27FC236}">
-                <a16:creationId xmlns:a16="http://schemas.microsoft.com/office/drawing/2014/main" id="{BF7F0FBC-C12D-C848-9472-E09020D7BAB4}"/>
-              </a:ext>
-            </a:extLst>
-          </p:cNvPr>
-          <p:cNvSpPr/>
-          <p:nvPr/>
-        </p:nvSpPr>
-        <p:spPr>
-          <a:xfrm>
-            <a:off x="226031" y="1845923"/>
-            <a:ext cx="1469205" cy="924674"/>
-          </a:xfrm>
-          <a:prstGeom prst="rect">
-            <a:avLst/>
-          </a:prstGeom>
-        </p:spPr>
-        <p:style>
-          <a:lnRef idx="2">
-            <a:schemeClr val="dk1"/>
-          </a:lnRef>
-          <a:fillRef idx="1">
-            <a:schemeClr val="lt1"/>
-          </a:fillRef>
-          <a:effectRef idx="0">
-            <a:schemeClr val="dk1"/>
-          </a:effectRef>
-          <a:fontRef idx="minor">
-            <a:schemeClr val="dk1"/>
-          </a:fontRef>
-        </p:style>
-        <p:txBody>
-          <a:bodyPr rtlCol="0" anchor="ctr"/>
-          <a:lstStyle/>
-          <a:p>
-            <a:pPr algn="ctr"/>
-            <a:r>
-              <a:rPr lang="en-US" dirty="0"/>
-              <a:t>Ambulance 1</a:t>
-            </a:r>
-          </a:p>
-        </p:txBody>
-      </p:sp>
-      <p:cxnSp>
-        <p:nvCxnSpPr>
-          <p:cNvPr id="8" name="Straight Arrow Connector 7">
-            <a:extLst>
-              <a:ext uri="{FF2B5EF4-FFF2-40B4-BE49-F238E27FC236}">
-                <a16:creationId xmlns:a16="http://schemas.microsoft.com/office/drawing/2014/main" id="{ED12CF4A-C3EB-F947-AB79-718D81846B45}"/>
-              </a:ext>
-            </a:extLst>
-          </p:cNvPr>
-          <p:cNvCxnSpPr>
-            <a:stCxn id="4" idx="2"/>
-            <a:endCxn id="6" idx="0"/>
-          </p:cNvCxnSpPr>
-          <p:nvPr/>
-        </p:nvCxnSpPr>
-        <p:spPr>
-          <a:xfrm>
-            <a:off x="960634" y="1488041"/>
-            <a:ext cx="0" cy="357882"/>
-          </a:xfrm>
-          <a:prstGeom prst="straightConnector1">
-            <a:avLst/>
-          </a:prstGeom>
-          <a:ln>
-            <a:tailEnd type="triangle"/>
-          </a:ln>
-        </p:spPr>
-        <p:style>
-          <a:lnRef idx="1">
-            <a:schemeClr val="accent1"/>
-          </a:lnRef>
-          <a:fillRef idx="0">
-            <a:schemeClr val="accent1"/>
-          </a:fillRef>
-          <a:effectRef idx="0">
-            <a:schemeClr val="accent1"/>
-          </a:effectRef>
-          <a:fontRef idx="minor">
-            <a:schemeClr val="tx1"/>
-          </a:fontRef>
-        </p:style>
-      </p:cxnSp>
-      <p:cxnSp>
-        <p:nvCxnSpPr>
-          <p:cNvPr id="10" name="Straight Arrow Connector 9">
-            <a:extLst>
-              <a:ext uri="{FF2B5EF4-FFF2-40B4-BE49-F238E27FC236}">
-                <a16:creationId xmlns:a16="http://schemas.microsoft.com/office/drawing/2014/main" id="{2A7EC17F-58A4-124E-9D3C-6209AC4F38B3}"/>
-              </a:ext>
-            </a:extLst>
-          </p:cNvPr>
-          <p:cNvCxnSpPr>
-            <a:stCxn id="6" idx="3"/>
-            <a:endCxn id="5" idx="1"/>
-          </p:cNvCxnSpPr>
-          <p:nvPr/>
-        </p:nvCxnSpPr>
-        <p:spPr>
-          <a:xfrm>
-            <a:off x="1695236" y="2308260"/>
-            <a:ext cx="734603" cy="0"/>
-          </a:xfrm>
-          <a:prstGeom prst="straightConnector1">
-            <a:avLst/>
-          </a:prstGeom>
-          <a:ln>
-            <a:tailEnd type="triangle"/>
-          </a:ln>
-        </p:spPr>
-        <p:style>
-          <a:lnRef idx="1">
-            <a:schemeClr val="accent1"/>
-          </a:lnRef>
-          <a:fillRef idx="0">
-            <a:schemeClr val="accent1"/>
-          </a:fillRef>
-          <a:effectRef idx="0">
-            <a:schemeClr val="accent1"/>
-          </a:effectRef>
-          <a:fontRef idx="minor">
-            <a:schemeClr val="tx1"/>
-          </a:fontRef>
-        </p:style>
-      </p:cxnSp>
-      <p:sp>
-        <p:nvSpPr>
-          <p:cNvPr id="11" name="Rectangle 10">
-            <a:extLst>
-              <a:ext uri="{FF2B5EF4-FFF2-40B4-BE49-F238E27FC236}">
-                <a16:creationId xmlns:a16="http://schemas.microsoft.com/office/drawing/2014/main" id="{333C45C3-C085-4248-B373-684F2FB150AC}"/>
-              </a:ext>
-            </a:extLst>
-          </p:cNvPr>
-          <p:cNvSpPr/>
-          <p:nvPr/>
-        </p:nvSpPr>
-        <p:spPr>
-          <a:xfrm>
-            <a:off x="4633647" y="2770597"/>
-            <a:ext cx="1469205" cy="924674"/>
-          </a:xfrm>
-          <a:prstGeom prst="rect">
-            <a:avLst/>
-          </a:prstGeom>
-        </p:spPr>
-        <p:style>
-          <a:lnRef idx="2">
-            <a:schemeClr val="dk1"/>
-          </a:lnRef>
-          <a:fillRef idx="1">
-            <a:schemeClr val="lt1"/>
-          </a:fillRef>
-          <a:effectRef idx="0">
-            <a:schemeClr val="dk1"/>
-          </a:effectRef>
-          <a:fontRef idx="minor">
-            <a:schemeClr val="dk1"/>
-          </a:fontRef>
-        </p:style>
-        <p:txBody>
-          <a:bodyPr rtlCol="0" anchor="ctr"/>
-          <a:lstStyle/>
-          <a:p>
-            <a:pPr algn="ctr"/>
-            <a:r>
-              <a:rPr lang="en-US" dirty="0"/>
-              <a:t>Response 02</a:t>
-            </a:r>
-          </a:p>
-          <a:p>
-            <a:pPr algn="ctr"/>
-            <a:r>
-              <a:rPr lang="en-US" dirty="0"/>
-              <a:t>John Smith</a:t>
-            </a:r>
-          </a:p>
-        </p:txBody>
-      </p:sp>
-      <p:cxnSp>
-        <p:nvCxnSpPr>
-          <p:cNvPr id="13" name="Elbow Connector 12">
-            <a:extLst>
-              <a:ext uri="{FF2B5EF4-FFF2-40B4-BE49-F238E27FC236}">
-                <a16:creationId xmlns:a16="http://schemas.microsoft.com/office/drawing/2014/main" id="{44BAB77F-E4D0-3146-89E1-365582A89369}"/>
-              </a:ext>
-            </a:extLst>
-          </p:cNvPr>
-          <p:cNvCxnSpPr>
-            <a:stCxn id="5" idx="3"/>
-            <a:endCxn id="3" idx="1"/>
-          </p:cNvCxnSpPr>
-          <p:nvPr/>
-        </p:nvCxnSpPr>
-        <p:spPr>
-          <a:xfrm flipV="1">
-            <a:off x="3899044" y="1383586"/>
-            <a:ext cx="734603" cy="924674"/>
-          </a:xfrm>
-          <a:prstGeom prst="bentConnector3">
-            <a:avLst/>
-          </a:prstGeom>
-          <a:ln>
-            <a:tailEnd type="triangle"/>
-          </a:ln>
-        </p:spPr>
-        <p:style>
-          <a:lnRef idx="1">
-            <a:schemeClr val="accent1"/>
-          </a:lnRef>
-          <a:fillRef idx="0">
-            <a:schemeClr val="accent1"/>
-          </a:fillRef>
-          <a:effectRef idx="0">
-            <a:schemeClr val="accent1"/>
-          </a:effectRef>
-          <a:fontRef idx="minor">
-            <a:schemeClr val="tx1"/>
-          </a:fontRef>
-        </p:style>
-      </p:cxnSp>
-      <p:cxnSp>
-        <p:nvCxnSpPr>
-          <p:cNvPr id="17" name="Elbow Connector 16">
-            <a:extLst>
-              <a:ext uri="{FF2B5EF4-FFF2-40B4-BE49-F238E27FC236}">
-                <a16:creationId xmlns:a16="http://schemas.microsoft.com/office/drawing/2014/main" id="{D2686D94-851A-F642-82A4-845DEC4D088C}"/>
-              </a:ext>
-            </a:extLst>
-          </p:cNvPr>
-          <p:cNvCxnSpPr>
-            <a:stCxn id="5" idx="3"/>
-            <a:endCxn id="11" idx="1"/>
-          </p:cNvCxnSpPr>
-          <p:nvPr/>
-        </p:nvCxnSpPr>
-        <p:spPr>
-          <a:xfrm>
-            <a:off x="3899044" y="2308260"/>
-            <a:ext cx="734603" cy="924674"/>
-          </a:xfrm>
-          <a:prstGeom prst="bentConnector3">
-            <a:avLst/>
-          </a:prstGeom>
-          <a:ln>
-            <a:tailEnd type="triangle"/>
-          </a:ln>
-        </p:spPr>
-        <p:style>
-          <a:lnRef idx="1">
-            <a:schemeClr val="accent1"/>
-          </a:lnRef>
-          <a:fillRef idx="0">
-            <a:schemeClr val="accent1"/>
-          </a:fillRef>
-          <a:effectRef idx="0">
-            <a:schemeClr val="accent1"/>
-          </a:effectRef>
-          <a:fontRef idx="minor">
-            <a:schemeClr val="tx1"/>
-          </a:fontRef>
-        </p:style>
-      </p:cxnSp>
-      <p:sp>
-        <p:nvSpPr>
-          <p:cNvPr id="18" name="Rectangle 17">
-            <a:extLst>
-              <a:ext uri="{FF2B5EF4-FFF2-40B4-BE49-F238E27FC236}">
-                <a16:creationId xmlns:a16="http://schemas.microsoft.com/office/drawing/2014/main" id="{1D4D9E38-6D5C-1543-B24A-C41D1169B54C}"/>
-              </a:ext>
-            </a:extLst>
-          </p:cNvPr>
-          <p:cNvSpPr/>
-          <p:nvPr/>
-        </p:nvSpPr>
-        <p:spPr>
-          <a:xfrm>
-            <a:off x="6707612" y="921249"/>
-            <a:ext cx="1469205" cy="924674"/>
-          </a:xfrm>
-          <a:prstGeom prst="rect">
-            <a:avLst/>
-          </a:prstGeom>
-        </p:spPr>
-        <p:style>
-          <a:lnRef idx="2">
-            <a:schemeClr val="dk1"/>
-          </a:lnRef>
-          <a:fillRef idx="1">
-            <a:schemeClr val="lt1"/>
-          </a:fillRef>
-          <a:effectRef idx="0">
-            <a:schemeClr val="dk1"/>
-          </a:effectRef>
-          <a:fontRef idx="minor">
-            <a:schemeClr val="dk1"/>
-          </a:fontRef>
-        </p:style>
-        <p:txBody>
-          <a:bodyPr rtlCol="0" anchor="ctr"/>
-          <a:lstStyle/>
-          <a:p>
-            <a:pPr algn="ctr"/>
-            <a:r>
-              <a:rPr lang="en-US" dirty="0"/>
-              <a:t>DETECT Screen</a:t>
-            </a:r>
-          </a:p>
-          <a:p>
-            <a:pPr algn="ctr"/>
-            <a:r>
-              <a:rPr lang="en-US" dirty="0"/>
-              <a:t>Mary Smith</a:t>
-            </a:r>
-          </a:p>
-        </p:txBody>
-      </p:sp>
-      <p:sp>
-        <p:nvSpPr>
-          <p:cNvPr id="19" name="Rectangle 18">
-            <a:extLst>
-              <a:ext uri="{FF2B5EF4-FFF2-40B4-BE49-F238E27FC236}">
-                <a16:creationId xmlns:a16="http://schemas.microsoft.com/office/drawing/2014/main" id="{EAE16655-E5B7-3648-9557-47FB72E13404}"/>
-              </a:ext>
-            </a:extLst>
-          </p:cNvPr>
-          <p:cNvSpPr/>
-          <p:nvPr/>
-        </p:nvSpPr>
-        <p:spPr>
-          <a:xfrm>
-            <a:off x="6707612" y="2770597"/>
-            <a:ext cx="1469205" cy="924674"/>
-          </a:xfrm>
-          <a:prstGeom prst="rect">
-            <a:avLst/>
-          </a:prstGeom>
-        </p:spPr>
-        <p:style>
-          <a:lnRef idx="2">
-            <a:schemeClr val="dk1"/>
-          </a:lnRef>
-          <a:fillRef idx="1">
-            <a:schemeClr val="lt1"/>
-          </a:fillRef>
-          <a:effectRef idx="0">
-            <a:schemeClr val="dk1"/>
-          </a:effectRef>
-          <a:fontRef idx="minor">
-            <a:schemeClr val="dk1"/>
-          </a:fontRef>
-        </p:style>
-        <p:txBody>
-          <a:bodyPr rtlCol="0" anchor="ctr"/>
-          <a:lstStyle/>
-          <a:p>
-            <a:pPr algn="ctr"/>
-            <a:r>
-              <a:rPr lang="en-US" dirty="0"/>
-              <a:t>DETECT Screen</a:t>
-            </a:r>
-          </a:p>
-          <a:p>
-            <a:pPr algn="ctr"/>
-            <a:r>
-              <a:rPr lang="en-US" dirty="0"/>
-              <a:t>John Smith</a:t>
-            </a:r>
-          </a:p>
-        </p:txBody>
-      </p:sp>
-      <p:cxnSp>
-        <p:nvCxnSpPr>
-          <p:cNvPr id="21" name="Straight Arrow Connector 20">
-            <a:extLst>
-              <a:ext uri="{FF2B5EF4-FFF2-40B4-BE49-F238E27FC236}">
-                <a16:creationId xmlns:a16="http://schemas.microsoft.com/office/drawing/2014/main" id="{EC382C02-B1C8-6946-8C3D-14E6FAA020C1}"/>
-              </a:ext>
-            </a:extLst>
-          </p:cNvPr>
-          <p:cNvCxnSpPr>
-            <a:stCxn id="3" idx="3"/>
-            <a:endCxn id="18" idx="1"/>
-          </p:cNvCxnSpPr>
-          <p:nvPr/>
-        </p:nvCxnSpPr>
-        <p:spPr>
-          <a:xfrm>
-            <a:off x="6102852" y="1383586"/>
-            <a:ext cx="604760" cy="0"/>
-          </a:xfrm>
-          <a:prstGeom prst="straightConnector1">
-            <a:avLst/>
-          </a:prstGeom>
-          <a:ln>
-            <a:tailEnd type="triangle"/>
-          </a:ln>
-        </p:spPr>
-        <p:style>
-          <a:lnRef idx="1">
-            <a:schemeClr val="accent1"/>
-          </a:lnRef>
-          <a:fillRef idx="0">
-            <a:schemeClr val="accent1"/>
-          </a:fillRef>
-          <a:effectRef idx="0">
-            <a:schemeClr val="accent1"/>
-          </a:effectRef>
-          <a:fontRef idx="minor">
-            <a:schemeClr val="tx1"/>
-          </a:fontRef>
-        </p:style>
-      </p:cxnSp>
-      <p:cxnSp>
-        <p:nvCxnSpPr>
-          <p:cNvPr id="23" name="Straight Arrow Connector 22">
-            <a:extLst>
-              <a:ext uri="{FF2B5EF4-FFF2-40B4-BE49-F238E27FC236}">
-                <a16:creationId xmlns:a16="http://schemas.microsoft.com/office/drawing/2014/main" id="{80B7F7AF-A37A-3542-A71B-036998C99973}"/>
-              </a:ext>
-            </a:extLst>
-          </p:cNvPr>
-          <p:cNvCxnSpPr>
-            <a:stCxn id="11" idx="3"/>
-            <a:endCxn id="19" idx="1"/>
-          </p:cNvCxnSpPr>
-          <p:nvPr/>
-        </p:nvCxnSpPr>
-        <p:spPr>
-          <a:xfrm>
-            <a:off x="6102852" y="3232934"/>
-            <a:ext cx="604760" cy="0"/>
-          </a:xfrm>
-          <a:prstGeom prst="straightConnector1">
-            <a:avLst/>
-          </a:prstGeom>
-          <a:ln>
-            <a:tailEnd type="triangle"/>
-          </a:ln>
-        </p:spPr>
-        <p:style>
-          <a:lnRef idx="1">
-            <a:schemeClr val="accent1"/>
-          </a:lnRef>
-          <a:fillRef idx="0">
-            <a:schemeClr val="accent1"/>
-          </a:fillRef>
-          <a:effectRef idx="0">
-            <a:schemeClr val="accent1"/>
-          </a:effectRef>
-          <a:fontRef idx="minor">
-            <a:schemeClr val="tx1"/>
-          </a:fontRef>
-        </p:style>
-      </p:cxnSp>
+        </p:grpSpPr>
+        <p:grpSp>
+          <p:nvGrpSpPr>
+            <p:cNvPr id="58" name="Group 57">
+              <a:extLst>
+                <a:ext uri="{FF2B5EF4-FFF2-40B4-BE49-F238E27FC236}">
+                  <a16:creationId xmlns:a16="http://schemas.microsoft.com/office/drawing/2014/main" id="{E7E697E7-1DD6-1E4E-9678-8D7B7498BF9B}"/>
+                </a:ext>
+              </a:extLst>
+            </p:cNvPr>
+            <p:cNvGrpSpPr/>
+            <p:nvPr/>
+          </p:nvGrpSpPr>
+          <p:grpSpPr>
+            <a:xfrm>
+              <a:off x="135176" y="1766776"/>
+              <a:ext cx="1655971" cy="1654698"/>
+              <a:chOff x="135176" y="2641408"/>
+              <a:chExt cx="1655971" cy="1654698"/>
+            </a:xfrm>
+          </p:grpSpPr>
+          <p:sp>
+            <p:nvSpPr>
+              <p:cNvPr id="9" name="Rounded Rectangle 8">
+                <a:extLst>
+                  <a:ext uri="{FF2B5EF4-FFF2-40B4-BE49-F238E27FC236}">
+                    <a16:creationId xmlns:a16="http://schemas.microsoft.com/office/drawing/2014/main" id="{E33557E1-F3B8-CC42-975E-9187FEF9C29F}"/>
+                  </a:ext>
+                </a:extLst>
+              </p:cNvPr>
+              <p:cNvSpPr/>
+              <p:nvPr/>
+            </p:nvSpPr>
+            <p:spPr>
+              <a:xfrm>
+                <a:off x="135176" y="2641408"/>
+                <a:ext cx="1655971" cy="1654698"/>
+              </a:xfrm>
+              <a:prstGeom prst="roundRect">
+                <a:avLst/>
+              </a:prstGeom>
+            </p:spPr>
+            <p:style>
+              <a:lnRef idx="2">
+                <a:schemeClr val="dk1"/>
+              </a:lnRef>
+              <a:fillRef idx="1">
+                <a:schemeClr val="lt1"/>
+              </a:fillRef>
+              <a:effectRef idx="0">
+                <a:schemeClr val="dk1"/>
+              </a:effectRef>
+              <a:fontRef idx="minor">
+                <a:schemeClr val="dk1"/>
+              </a:fontRef>
+            </p:style>
+            <p:txBody>
+              <a:bodyPr rtlCol="0" anchor="ctr"/>
+              <a:lstStyle/>
+              <a:p>
+                <a:pPr algn="ctr"/>
+                <a:endParaRPr lang="en-US"/>
+              </a:p>
+            </p:txBody>
+          </p:sp>
+          <p:pic>
+            <p:nvPicPr>
+              <p:cNvPr id="8" name="Picture 7">
+                <a:extLst>
+                  <a:ext uri="{FF2B5EF4-FFF2-40B4-BE49-F238E27FC236}">
+                    <a16:creationId xmlns:a16="http://schemas.microsoft.com/office/drawing/2014/main" id="{EF2CEA02-EA6D-1A47-9CBE-75AD8CCA21D6}"/>
+                  </a:ext>
+                </a:extLst>
+              </p:cNvPr>
+              <p:cNvPicPr>
+                <a:picLocks noChangeAspect="1"/>
+              </p:cNvPicPr>
+              <p:nvPr/>
+            </p:nvPicPr>
+            <p:blipFill>
+              <a:blip r:embed="rId3"/>
+              <a:stretch>
+                <a:fillRect/>
+              </a:stretch>
+            </p:blipFill>
+            <p:spPr>
+              <a:xfrm>
+                <a:off x="322054" y="2739819"/>
+                <a:ext cx="1327017" cy="1486750"/>
+              </a:xfrm>
+              <a:prstGeom prst="rect">
+                <a:avLst/>
+              </a:prstGeom>
+            </p:spPr>
+          </p:pic>
+          <p:sp>
+            <p:nvSpPr>
+              <p:cNvPr id="4" name="Rectangle 3">
+                <a:extLst>
+                  <a:ext uri="{FF2B5EF4-FFF2-40B4-BE49-F238E27FC236}">
+                    <a16:creationId xmlns:a16="http://schemas.microsoft.com/office/drawing/2014/main" id="{8670074E-19EB-8444-B966-96CA64E086FA}"/>
+                  </a:ext>
+                </a:extLst>
+              </p:cNvPr>
+              <p:cNvSpPr/>
+              <p:nvPr/>
+            </p:nvSpPr>
+            <p:spPr>
+              <a:xfrm>
+                <a:off x="449545" y="3187231"/>
+                <a:ext cx="422177" cy="181672"/>
+              </a:xfrm>
+              <a:prstGeom prst="rect">
+                <a:avLst/>
+              </a:prstGeom>
+              <a:ln>
+                <a:noFill/>
+              </a:ln>
+            </p:spPr>
+            <p:style>
+              <a:lnRef idx="2">
+                <a:schemeClr val="dk1"/>
+              </a:lnRef>
+              <a:fillRef idx="1">
+                <a:schemeClr val="lt1"/>
+              </a:fillRef>
+              <a:effectRef idx="0">
+                <a:schemeClr val="dk1"/>
+              </a:effectRef>
+              <a:fontRef idx="minor">
+                <a:schemeClr val="dk1"/>
+              </a:fontRef>
+            </p:style>
+            <p:txBody>
+              <a:bodyPr rtlCol="0" anchor="ctr"/>
+              <a:lstStyle/>
+              <a:p>
+                <a:pPr algn="ctr"/>
+                <a:r>
+                  <a:rPr lang="en-US" sz="1200" dirty="0"/>
+                  <a:t>911</a:t>
+                </a:r>
+              </a:p>
+            </p:txBody>
+          </p:sp>
+        </p:grpSp>
+        <p:sp>
+          <p:nvSpPr>
+            <p:cNvPr id="15" name="TextBox 14">
+              <a:extLst>
+                <a:ext uri="{FF2B5EF4-FFF2-40B4-BE49-F238E27FC236}">
+                  <a16:creationId xmlns:a16="http://schemas.microsoft.com/office/drawing/2014/main" id="{FAD04D02-766F-D347-8FCD-64E7099B4BC7}"/>
+                </a:ext>
+              </a:extLst>
+            </p:cNvPr>
+            <p:cNvSpPr txBox="1"/>
+            <p:nvPr/>
+          </p:nvSpPr>
+          <p:spPr>
+            <a:xfrm>
+              <a:off x="117416" y="1361674"/>
+              <a:ext cx="1691489" cy="307777"/>
+            </a:xfrm>
+            <a:prstGeom prst="rect">
+              <a:avLst/>
+            </a:prstGeom>
+            <a:noFill/>
+          </p:spPr>
+          <p:txBody>
+            <a:bodyPr wrap="none" rtlCol="0">
+              <a:spAutoFit/>
+            </a:bodyPr>
+            <a:lstStyle/>
+            <a:p>
+              <a:pPr algn="ctr"/>
+              <a:r>
+                <a:rPr lang="en-US" sz="1400" dirty="0"/>
+                <a:t>1. A 911 Call is made</a:t>
+              </a:r>
+            </a:p>
+          </p:txBody>
+        </p:sp>
+        <p:grpSp>
+          <p:nvGrpSpPr>
+            <p:cNvPr id="59" name="Group 58">
+              <a:extLst>
+                <a:ext uri="{FF2B5EF4-FFF2-40B4-BE49-F238E27FC236}">
+                  <a16:creationId xmlns:a16="http://schemas.microsoft.com/office/drawing/2014/main" id="{148051B0-8F97-8F4F-8B7F-998FF9B4AA59}"/>
+                </a:ext>
+              </a:extLst>
+            </p:cNvPr>
+            <p:cNvGrpSpPr/>
+            <p:nvPr/>
+          </p:nvGrpSpPr>
+          <p:grpSpPr>
+            <a:xfrm>
+              <a:off x="2319490" y="1781213"/>
+              <a:ext cx="1655971" cy="1654698"/>
+              <a:chOff x="2319490" y="2655845"/>
+              <a:chExt cx="1655971" cy="1654698"/>
+            </a:xfrm>
+          </p:grpSpPr>
+          <p:sp>
+            <p:nvSpPr>
+              <p:cNvPr id="26" name="Rounded Rectangle 25">
+                <a:extLst>
+                  <a:ext uri="{FF2B5EF4-FFF2-40B4-BE49-F238E27FC236}">
+                    <a16:creationId xmlns:a16="http://schemas.microsoft.com/office/drawing/2014/main" id="{DD56DADE-58FB-0149-8438-632FDB8F87F0}"/>
+                  </a:ext>
+                </a:extLst>
+              </p:cNvPr>
+              <p:cNvSpPr/>
+              <p:nvPr/>
+            </p:nvSpPr>
+            <p:spPr>
+              <a:xfrm>
+                <a:off x="2319490" y="2655845"/>
+                <a:ext cx="1655971" cy="1654698"/>
+              </a:xfrm>
+              <a:prstGeom prst="roundRect">
+                <a:avLst/>
+              </a:prstGeom>
+            </p:spPr>
+            <p:style>
+              <a:lnRef idx="2">
+                <a:schemeClr val="dk1"/>
+              </a:lnRef>
+              <a:fillRef idx="1">
+                <a:schemeClr val="lt1"/>
+              </a:fillRef>
+              <a:effectRef idx="0">
+                <a:schemeClr val="dk1"/>
+              </a:effectRef>
+              <a:fontRef idx="minor">
+                <a:schemeClr val="dk1"/>
+              </a:fontRef>
+            </p:style>
+            <p:txBody>
+              <a:bodyPr rtlCol="0" anchor="ctr"/>
+              <a:lstStyle/>
+              <a:p>
+                <a:pPr algn="ctr"/>
+                <a:endParaRPr lang="en-US"/>
+              </a:p>
+            </p:txBody>
+          </p:sp>
+          <p:pic>
+            <p:nvPicPr>
+              <p:cNvPr id="16" name="Picture 15">
+                <a:extLst>
+                  <a:ext uri="{FF2B5EF4-FFF2-40B4-BE49-F238E27FC236}">
+                    <a16:creationId xmlns:a16="http://schemas.microsoft.com/office/drawing/2014/main" id="{47BBA70C-536E-B94C-933B-0E4D24902DEB}"/>
+                  </a:ext>
+                </a:extLst>
+              </p:cNvPr>
+              <p:cNvPicPr>
+                <a:picLocks noChangeAspect="1"/>
+              </p:cNvPicPr>
+              <p:nvPr/>
+            </p:nvPicPr>
+            <p:blipFill>
+              <a:blip r:embed="rId4"/>
+              <a:stretch>
+                <a:fillRect/>
+              </a:stretch>
+            </p:blipFill>
+            <p:spPr>
+              <a:xfrm>
+                <a:off x="2392716" y="3132770"/>
+                <a:ext cx="1509518" cy="700848"/>
+              </a:xfrm>
+              <a:prstGeom prst="rect">
+                <a:avLst/>
+              </a:prstGeom>
+            </p:spPr>
+          </p:pic>
+        </p:grpSp>
+        <p:sp>
+          <p:nvSpPr>
+            <p:cNvPr id="29" name="TextBox 28">
+              <a:extLst>
+                <a:ext uri="{FF2B5EF4-FFF2-40B4-BE49-F238E27FC236}">
+                  <a16:creationId xmlns:a16="http://schemas.microsoft.com/office/drawing/2014/main" id="{9ABB41AF-0D26-2C44-89AB-62AE4ADF7773}"/>
+                </a:ext>
+              </a:extLst>
+            </p:cNvPr>
+            <p:cNvSpPr txBox="1"/>
+            <p:nvPr/>
+          </p:nvSpPr>
+          <p:spPr>
+            <a:xfrm>
+              <a:off x="2307820" y="920519"/>
+              <a:ext cx="3700402" cy="662724"/>
+            </a:xfrm>
+            <a:prstGeom prst="rect">
+              <a:avLst/>
+            </a:prstGeom>
+            <a:noFill/>
+          </p:spPr>
+          <p:txBody>
+            <a:bodyPr wrap="square" rtlCol="0">
+              <a:spAutoFit/>
+            </a:bodyPr>
+            <a:lstStyle/>
+            <a:p>
+              <a:pPr algn="ctr"/>
+              <a:r>
+                <a:rPr lang="en-US" sz="1400" dirty="0"/>
+                <a:t>2. An ambulance is dispatched to the scene.</a:t>
+              </a:r>
+            </a:p>
+            <a:p>
+              <a:pPr algn="ctr"/>
+              <a:r>
+                <a:rPr lang="en-US" sz="1400" dirty="0"/>
+                <a:t>This is considered an incident and assigned and </a:t>
+              </a:r>
+              <a:r>
+                <a:rPr lang="en-US" sz="1400" b="1" dirty="0"/>
+                <a:t>incident/response number</a:t>
+              </a:r>
+              <a:r>
+                <a:rPr lang="en-US" sz="1400" dirty="0"/>
+                <a:t>.</a:t>
+              </a:r>
+            </a:p>
+          </p:txBody>
+        </p:sp>
+        <p:grpSp>
+          <p:nvGrpSpPr>
+            <p:cNvPr id="60" name="Group 59">
+              <a:extLst>
+                <a:ext uri="{FF2B5EF4-FFF2-40B4-BE49-F238E27FC236}">
+                  <a16:creationId xmlns:a16="http://schemas.microsoft.com/office/drawing/2014/main" id="{0FEB77F1-5BE6-B147-9A57-301FA86B5DAB}"/>
+                </a:ext>
+              </a:extLst>
+            </p:cNvPr>
+            <p:cNvGrpSpPr/>
+            <p:nvPr/>
+          </p:nvGrpSpPr>
+          <p:grpSpPr>
+            <a:xfrm>
+              <a:off x="4503804" y="1766776"/>
+              <a:ext cx="1655971" cy="1654698"/>
+              <a:chOff x="4503804" y="2641408"/>
+              <a:chExt cx="1655971" cy="1654698"/>
+            </a:xfrm>
+          </p:grpSpPr>
+          <p:sp>
+            <p:nvSpPr>
+              <p:cNvPr id="34" name="Rounded Rectangle 33">
+                <a:extLst>
+                  <a:ext uri="{FF2B5EF4-FFF2-40B4-BE49-F238E27FC236}">
+                    <a16:creationId xmlns:a16="http://schemas.microsoft.com/office/drawing/2014/main" id="{CCD2D9E2-8BF1-494D-9C7E-FD5D1B0621F0}"/>
+                  </a:ext>
+                </a:extLst>
+              </p:cNvPr>
+              <p:cNvSpPr/>
+              <p:nvPr/>
+            </p:nvSpPr>
+            <p:spPr>
+              <a:xfrm>
+                <a:off x="4503804" y="2641408"/>
+                <a:ext cx="1655971" cy="1654698"/>
+              </a:xfrm>
+              <a:prstGeom prst="roundRect">
+                <a:avLst/>
+              </a:prstGeom>
+            </p:spPr>
+            <p:style>
+              <a:lnRef idx="2">
+                <a:schemeClr val="dk1"/>
+              </a:lnRef>
+              <a:fillRef idx="1">
+                <a:schemeClr val="lt1"/>
+              </a:fillRef>
+              <a:effectRef idx="0">
+                <a:schemeClr val="dk1"/>
+              </a:effectRef>
+              <a:fontRef idx="minor">
+                <a:schemeClr val="dk1"/>
+              </a:fontRef>
+            </p:style>
+            <p:txBody>
+              <a:bodyPr rtlCol="0" anchor="ctr"/>
+              <a:lstStyle/>
+              <a:p>
+                <a:pPr algn="ctr"/>
+                <a:endParaRPr lang="en-US"/>
+              </a:p>
+            </p:txBody>
+          </p:sp>
+          <p:pic>
+            <p:nvPicPr>
+              <p:cNvPr id="33" name="Picture 32">
+                <a:extLst>
+                  <a:ext uri="{FF2B5EF4-FFF2-40B4-BE49-F238E27FC236}">
+                    <a16:creationId xmlns:a16="http://schemas.microsoft.com/office/drawing/2014/main" id="{78E62F95-DE41-C64D-813F-CAC5FFCF745A}"/>
+                  </a:ext>
+                </a:extLst>
+              </p:cNvPr>
+              <p:cNvPicPr>
+                <a:picLocks noChangeAspect="1"/>
+              </p:cNvPicPr>
+              <p:nvPr/>
+            </p:nvPicPr>
+            <p:blipFill>
+              <a:blip r:embed="rId5">
+                <a:extLst>
+                  <a:ext uri="{28A0092B-C50C-407E-A947-70E740481C1C}">
+                    <a14:useLocalDpi xmlns:a14="http://schemas.microsoft.com/office/drawing/2010/main" val="0"/>
+                  </a:ext>
+                </a:extLst>
+              </a:blip>
+              <a:stretch>
+                <a:fillRect/>
+              </a:stretch>
+            </p:blipFill>
+            <p:spPr>
+              <a:xfrm>
+                <a:off x="4601882" y="2822801"/>
+                <a:ext cx="1459813" cy="1291912"/>
+              </a:xfrm>
+              <a:prstGeom prst="rect">
+                <a:avLst/>
+              </a:prstGeom>
+            </p:spPr>
+          </p:pic>
+        </p:grpSp>
+        <p:grpSp>
+          <p:nvGrpSpPr>
+            <p:cNvPr id="61" name="Group 60">
+              <a:extLst>
+                <a:ext uri="{FF2B5EF4-FFF2-40B4-BE49-F238E27FC236}">
+                  <a16:creationId xmlns:a16="http://schemas.microsoft.com/office/drawing/2014/main" id="{2993FF7C-52C1-F640-BB2E-4455001A1FFF}"/>
+                </a:ext>
+              </a:extLst>
+            </p:cNvPr>
+            <p:cNvGrpSpPr/>
+            <p:nvPr/>
+          </p:nvGrpSpPr>
+          <p:grpSpPr>
+            <a:xfrm>
+              <a:off x="6688118" y="1766776"/>
+              <a:ext cx="1655971" cy="1654698"/>
+              <a:chOff x="6688118" y="2641408"/>
+              <a:chExt cx="1655971" cy="1654698"/>
+            </a:xfrm>
+          </p:grpSpPr>
+          <p:sp>
+            <p:nvSpPr>
+              <p:cNvPr id="39" name="Rounded Rectangle 38">
+                <a:extLst>
+                  <a:ext uri="{FF2B5EF4-FFF2-40B4-BE49-F238E27FC236}">
+                    <a16:creationId xmlns:a16="http://schemas.microsoft.com/office/drawing/2014/main" id="{99551ABD-7080-9A4E-B641-77DFA614759C}"/>
+                  </a:ext>
+                </a:extLst>
+              </p:cNvPr>
+              <p:cNvSpPr/>
+              <p:nvPr/>
+            </p:nvSpPr>
+            <p:spPr>
+              <a:xfrm>
+                <a:off x="6688118" y="2641408"/>
+                <a:ext cx="1655971" cy="1654698"/>
+              </a:xfrm>
+              <a:prstGeom prst="roundRect">
+                <a:avLst/>
+              </a:prstGeom>
+            </p:spPr>
+            <p:style>
+              <a:lnRef idx="2">
+                <a:schemeClr val="dk1"/>
+              </a:lnRef>
+              <a:fillRef idx="1">
+                <a:schemeClr val="lt1"/>
+              </a:fillRef>
+              <a:effectRef idx="0">
+                <a:schemeClr val="dk1"/>
+              </a:effectRef>
+              <a:fontRef idx="minor">
+                <a:schemeClr val="dk1"/>
+              </a:fontRef>
+            </p:style>
+            <p:txBody>
+              <a:bodyPr rtlCol="0" anchor="b"/>
+              <a:lstStyle/>
+              <a:p>
+                <a:pPr algn="ctr"/>
+                <a:r>
+                  <a:rPr lang="en-US" sz="1500" dirty="0"/>
+                  <a:t>Mary Smith</a:t>
+                </a:r>
+              </a:p>
+              <a:p>
+                <a:pPr algn="ctr"/>
+                <a:r>
+                  <a:rPr lang="en-US" sz="1500" dirty="0"/>
+                  <a:t>Incident PCR Number = 15000001</a:t>
+                </a:r>
+              </a:p>
+            </p:txBody>
+          </p:sp>
+          <p:pic>
+            <p:nvPicPr>
+              <p:cNvPr id="38" name="Picture 37">
+                <a:extLst>
+                  <a:ext uri="{FF2B5EF4-FFF2-40B4-BE49-F238E27FC236}">
+                    <a16:creationId xmlns:a16="http://schemas.microsoft.com/office/drawing/2014/main" id="{752A71E1-405B-B649-8A71-180661B16593}"/>
+                  </a:ext>
+                </a:extLst>
+              </p:cNvPr>
+              <p:cNvPicPr>
+                <a:picLocks noChangeAspect="1"/>
+              </p:cNvPicPr>
+              <p:nvPr/>
+            </p:nvPicPr>
+            <p:blipFill>
+              <a:blip r:embed="rId6"/>
+              <a:stretch>
+                <a:fillRect/>
+              </a:stretch>
+            </p:blipFill>
+            <p:spPr>
+              <a:xfrm>
+                <a:off x="7250731" y="2691105"/>
+                <a:ext cx="473110" cy="622795"/>
+              </a:xfrm>
+              <a:prstGeom prst="rect">
+                <a:avLst/>
+              </a:prstGeom>
+            </p:spPr>
+          </p:pic>
+        </p:grpSp>
+        <p:grpSp>
+          <p:nvGrpSpPr>
+            <p:cNvPr id="62" name="Group 61">
+              <a:extLst>
+                <a:ext uri="{FF2B5EF4-FFF2-40B4-BE49-F238E27FC236}">
+                  <a16:creationId xmlns:a16="http://schemas.microsoft.com/office/drawing/2014/main" id="{38AAAFFE-BCE0-F44C-8643-780C15C2C5FA}"/>
+                </a:ext>
+              </a:extLst>
+            </p:cNvPr>
+            <p:cNvGrpSpPr/>
+            <p:nvPr/>
+          </p:nvGrpSpPr>
+          <p:grpSpPr>
+            <a:xfrm>
+              <a:off x="8872432" y="1781213"/>
+              <a:ext cx="1655971" cy="1654698"/>
+              <a:chOff x="8872432" y="2655845"/>
+              <a:chExt cx="1655971" cy="1654698"/>
+            </a:xfrm>
+          </p:grpSpPr>
+          <p:sp>
+            <p:nvSpPr>
+              <p:cNvPr id="41" name="Rounded Rectangle 40">
+                <a:extLst>
+                  <a:ext uri="{FF2B5EF4-FFF2-40B4-BE49-F238E27FC236}">
+                    <a16:creationId xmlns:a16="http://schemas.microsoft.com/office/drawing/2014/main" id="{3E1B983F-B18F-0F44-8C41-04C9ABB1A0F3}"/>
+                  </a:ext>
+                </a:extLst>
+              </p:cNvPr>
+              <p:cNvSpPr/>
+              <p:nvPr/>
+            </p:nvSpPr>
+            <p:spPr>
+              <a:xfrm>
+                <a:off x="8872432" y="2655845"/>
+                <a:ext cx="1655971" cy="1654698"/>
+              </a:xfrm>
+              <a:prstGeom prst="roundRect">
+                <a:avLst/>
+              </a:prstGeom>
+            </p:spPr>
+            <p:style>
+              <a:lnRef idx="2">
+                <a:schemeClr val="dk1"/>
+              </a:lnRef>
+              <a:fillRef idx="1">
+                <a:schemeClr val="lt1"/>
+              </a:fillRef>
+              <a:effectRef idx="0">
+                <a:schemeClr val="dk1"/>
+              </a:effectRef>
+              <a:fontRef idx="minor">
+                <a:schemeClr val="dk1"/>
+              </a:fontRef>
+            </p:style>
+            <p:txBody>
+              <a:bodyPr rtlCol="0" anchor="ctr"/>
+              <a:lstStyle/>
+              <a:p>
+                <a:pPr algn="ctr"/>
+                <a:endParaRPr lang="en-US"/>
+              </a:p>
+            </p:txBody>
+          </p:sp>
+          <p:pic>
+            <p:nvPicPr>
+              <p:cNvPr id="43" name="Picture 42">
+                <a:extLst>
+                  <a:ext uri="{FF2B5EF4-FFF2-40B4-BE49-F238E27FC236}">
+                    <a16:creationId xmlns:a16="http://schemas.microsoft.com/office/drawing/2014/main" id="{B453573B-9BD4-3D47-96F5-6982D7141929}"/>
+                  </a:ext>
+                </a:extLst>
+              </p:cNvPr>
+              <p:cNvPicPr>
+                <a:picLocks noChangeAspect="1"/>
+              </p:cNvPicPr>
+              <p:nvPr/>
+            </p:nvPicPr>
+            <p:blipFill>
+              <a:blip r:embed="rId7">
+                <a:extLst>
+                  <a:ext uri="{28A0092B-C50C-407E-A947-70E740481C1C}">
+                    <a14:useLocalDpi xmlns:a14="http://schemas.microsoft.com/office/drawing/2010/main" val="0"/>
+                  </a:ext>
+                </a:extLst>
+              </a:blip>
+              <a:stretch>
+                <a:fillRect/>
+              </a:stretch>
+            </p:blipFill>
+            <p:spPr>
+              <a:xfrm>
+                <a:off x="8997346" y="2890606"/>
+                <a:ext cx="1406141" cy="1185176"/>
+              </a:xfrm>
+              <a:prstGeom prst="rect">
+                <a:avLst/>
+              </a:prstGeom>
+            </p:spPr>
+          </p:pic>
+        </p:grpSp>
+        <p:sp>
+          <p:nvSpPr>
+            <p:cNvPr id="45" name="TextBox 44">
+              <a:extLst>
+                <a:ext uri="{FF2B5EF4-FFF2-40B4-BE49-F238E27FC236}">
+                  <a16:creationId xmlns:a16="http://schemas.microsoft.com/office/drawing/2014/main" id="{37ACE795-F539-234F-BEB4-15D78EFDD978}"/>
+                </a:ext>
+              </a:extLst>
+            </p:cNvPr>
+            <p:cNvSpPr txBox="1"/>
+            <p:nvPr/>
+          </p:nvSpPr>
+          <p:spPr>
+            <a:xfrm>
+              <a:off x="6701370" y="717556"/>
+              <a:ext cx="3700402" cy="856018"/>
+            </a:xfrm>
+            <a:prstGeom prst="rect">
+              <a:avLst/>
+            </a:prstGeom>
+            <a:noFill/>
+          </p:spPr>
+          <p:txBody>
+            <a:bodyPr wrap="square" rtlCol="0">
+              <a:spAutoFit/>
+            </a:bodyPr>
+            <a:lstStyle/>
+            <a:p>
+              <a:pPr algn="ctr"/>
+              <a:r>
+                <a:rPr lang="en-US" sz="1400" dirty="0"/>
+                <a:t>3. A single record is created in </a:t>
+              </a:r>
+              <a:r>
+                <a:rPr lang="en-US" sz="1400" dirty="0" err="1"/>
+                <a:t>MedStar’s</a:t>
+              </a:r>
+              <a:r>
+                <a:rPr lang="en-US" sz="1400" dirty="0"/>
+                <a:t> </a:t>
+              </a:r>
+              <a:r>
+                <a:rPr lang="en-US" sz="1400" dirty="0" err="1"/>
+                <a:t>ePCR</a:t>
+              </a:r>
+              <a:r>
+                <a:rPr lang="en-US" sz="1400" dirty="0"/>
+                <a:t> for this person at this incident. It is then assigned an </a:t>
+              </a:r>
+              <a:r>
+                <a:rPr lang="en-US" sz="1400" b="1" dirty="0"/>
+                <a:t>incident PCR number</a:t>
+              </a:r>
+              <a:r>
+                <a:rPr lang="en-US" sz="1400" dirty="0"/>
+                <a:t>. There can be only one DETECT screening per incident PCR number.</a:t>
+              </a:r>
+            </a:p>
+          </p:txBody>
+        </p:sp>
+        <p:cxnSp>
+          <p:nvCxnSpPr>
+            <p:cNvPr id="51" name="Straight Arrow Connector 50">
+              <a:extLst>
+                <a:ext uri="{FF2B5EF4-FFF2-40B4-BE49-F238E27FC236}">
+                  <a16:creationId xmlns:a16="http://schemas.microsoft.com/office/drawing/2014/main" id="{53E1478C-32D9-8F41-B404-A4D97E17AC0E}"/>
+                </a:ext>
+              </a:extLst>
+            </p:cNvPr>
+            <p:cNvCxnSpPr>
+              <a:stCxn id="9" idx="3"/>
+              <a:endCxn id="26" idx="1"/>
+            </p:cNvCxnSpPr>
+            <p:nvPr/>
+          </p:nvCxnSpPr>
+          <p:spPr>
+            <a:xfrm>
+              <a:off x="1791147" y="2594125"/>
+              <a:ext cx="528343" cy="0"/>
+            </a:xfrm>
+            <a:prstGeom prst="straightConnector1">
+              <a:avLst/>
+            </a:prstGeom>
+            <a:ln>
+              <a:tailEnd type="triangle"/>
+            </a:ln>
+          </p:spPr>
+          <p:style>
+            <a:lnRef idx="1">
+              <a:schemeClr val="accent1"/>
+            </a:lnRef>
+            <a:fillRef idx="0">
+              <a:schemeClr val="accent1"/>
+            </a:fillRef>
+            <a:effectRef idx="0">
+              <a:schemeClr val="accent1"/>
+            </a:effectRef>
+            <a:fontRef idx="minor">
+              <a:schemeClr val="tx1"/>
+            </a:fontRef>
+          </p:style>
+        </p:cxnSp>
+        <p:cxnSp>
+          <p:nvCxnSpPr>
+            <p:cNvPr id="53" name="Straight Arrow Connector 52">
+              <a:extLst>
+                <a:ext uri="{FF2B5EF4-FFF2-40B4-BE49-F238E27FC236}">
+                  <a16:creationId xmlns:a16="http://schemas.microsoft.com/office/drawing/2014/main" id="{FFA0AC94-7DDA-804B-90C9-0B15A67C5D36}"/>
+                </a:ext>
+              </a:extLst>
+            </p:cNvPr>
+            <p:cNvCxnSpPr>
+              <a:stCxn id="26" idx="3"/>
+              <a:endCxn id="34" idx="1"/>
+            </p:cNvCxnSpPr>
+            <p:nvPr/>
+          </p:nvCxnSpPr>
+          <p:spPr>
+            <a:xfrm flipV="1">
+              <a:off x="3975461" y="2594125"/>
+              <a:ext cx="528343" cy="0"/>
+            </a:xfrm>
+            <a:prstGeom prst="straightConnector1">
+              <a:avLst/>
+            </a:prstGeom>
+            <a:ln>
+              <a:tailEnd type="triangle"/>
+            </a:ln>
+          </p:spPr>
+          <p:style>
+            <a:lnRef idx="1">
+              <a:schemeClr val="accent1"/>
+            </a:lnRef>
+            <a:fillRef idx="0">
+              <a:schemeClr val="accent1"/>
+            </a:fillRef>
+            <a:effectRef idx="0">
+              <a:schemeClr val="accent1"/>
+            </a:effectRef>
+            <a:fontRef idx="minor">
+              <a:schemeClr val="tx1"/>
+            </a:fontRef>
+          </p:style>
+        </p:cxnSp>
+        <p:cxnSp>
+          <p:nvCxnSpPr>
+            <p:cNvPr id="55" name="Straight Arrow Connector 54">
+              <a:extLst>
+                <a:ext uri="{FF2B5EF4-FFF2-40B4-BE49-F238E27FC236}">
+                  <a16:creationId xmlns:a16="http://schemas.microsoft.com/office/drawing/2014/main" id="{CF27DE72-CD90-9240-90FE-200A9D6BE2B6}"/>
+                </a:ext>
+              </a:extLst>
+            </p:cNvPr>
+            <p:cNvCxnSpPr>
+              <a:stCxn id="34" idx="3"/>
+              <a:endCxn id="39" idx="1"/>
+            </p:cNvCxnSpPr>
+            <p:nvPr/>
+          </p:nvCxnSpPr>
+          <p:spPr>
+            <a:xfrm>
+              <a:off x="6159775" y="2594125"/>
+              <a:ext cx="528343" cy="0"/>
+            </a:xfrm>
+            <a:prstGeom prst="straightConnector1">
+              <a:avLst/>
+            </a:prstGeom>
+            <a:ln>
+              <a:tailEnd type="triangle"/>
+            </a:ln>
+          </p:spPr>
+          <p:style>
+            <a:lnRef idx="1">
+              <a:schemeClr val="accent1"/>
+            </a:lnRef>
+            <a:fillRef idx="0">
+              <a:schemeClr val="accent1"/>
+            </a:fillRef>
+            <a:effectRef idx="0">
+              <a:schemeClr val="accent1"/>
+            </a:effectRef>
+            <a:fontRef idx="minor">
+              <a:schemeClr val="tx1"/>
+            </a:fontRef>
+          </p:style>
+        </p:cxnSp>
+        <p:cxnSp>
+          <p:nvCxnSpPr>
+            <p:cNvPr id="57" name="Straight Arrow Connector 56">
+              <a:extLst>
+                <a:ext uri="{FF2B5EF4-FFF2-40B4-BE49-F238E27FC236}">
+                  <a16:creationId xmlns:a16="http://schemas.microsoft.com/office/drawing/2014/main" id="{BFEC2181-AB9B-CB48-9BFF-D07E4B724982}"/>
+                </a:ext>
+              </a:extLst>
+            </p:cNvPr>
+            <p:cNvCxnSpPr>
+              <a:stCxn id="39" idx="3"/>
+              <a:endCxn id="41" idx="1"/>
+            </p:cNvCxnSpPr>
+            <p:nvPr/>
+          </p:nvCxnSpPr>
+          <p:spPr>
+            <a:xfrm>
+              <a:off x="8344089" y="2594125"/>
+              <a:ext cx="528343" cy="0"/>
+            </a:xfrm>
+            <a:prstGeom prst="straightConnector1">
+              <a:avLst/>
+            </a:prstGeom>
+            <a:ln>
+              <a:tailEnd type="triangle"/>
+            </a:ln>
+          </p:spPr>
+          <p:style>
+            <a:lnRef idx="1">
+              <a:schemeClr val="accent1"/>
+            </a:lnRef>
+            <a:fillRef idx="0">
+              <a:schemeClr val="accent1"/>
+            </a:fillRef>
+            <a:effectRef idx="0">
+              <a:schemeClr val="accent1"/>
+            </a:effectRef>
+            <a:fontRef idx="minor">
+              <a:schemeClr val="tx1"/>
+            </a:fontRef>
+          </p:style>
+        </p:cxnSp>
+        <p:grpSp>
+          <p:nvGrpSpPr>
+            <p:cNvPr id="63" name="Group 62">
+              <a:extLst>
+                <a:ext uri="{FF2B5EF4-FFF2-40B4-BE49-F238E27FC236}">
+                  <a16:creationId xmlns:a16="http://schemas.microsoft.com/office/drawing/2014/main" id="{5771FEBA-FA65-CB4F-B1DD-8EE91635D3AC}"/>
+                </a:ext>
+              </a:extLst>
+            </p:cNvPr>
+            <p:cNvGrpSpPr/>
+            <p:nvPr/>
+          </p:nvGrpSpPr>
+          <p:grpSpPr>
+            <a:xfrm>
+              <a:off x="6659300" y="3717916"/>
+              <a:ext cx="1655971" cy="1654698"/>
+              <a:chOff x="6688118" y="2641408"/>
+              <a:chExt cx="1655971" cy="1654698"/>
+            </a:xfrm>
+          </p:grpSpPr>
+          <p:sp>
+            <p:nvSpPr>
+              <p:cNvPr id="64" name="Rounded Rectangle 63">
+                <a:extLst>
+                  <a:ext uri="{FF2B5EF4-FFF2-40B4-BE49-F238E27FC236}">
+                    <a16:creationId xmlns:a16="http://schemas.microsoft.com/office/drawing/2014/main" id="{A9BC6213-63FF-C04F-8ED7-F9F1E56AD4E4}"/>
+                  </a:ext>
+                </a:extLst>
+              </p:cNvPr>
+              <p:cNvSpPr/>
+              <p:nvPr/>
+            </p:nvSpPr>
+            <p:spPr>
+              <a:xfrm>
+                <a:off x="6688118" y="2641408"/>
+                <a:ext cx="1655971" cy="1654698"/>
+              </a:xfrm>
+              <a:prstGeom prst="roundRect">
+                <a:avLst/>
+              </a:prstGeom>
+            </p:spPr>
+            <p:style>
+              <a:lnRef idx="2">
+                <a:schemeClr val="dk1"/>
+              </a:lnRef>
+              <a:fillRef idx="1">
+                <a:schemeClr val="lt1"/>
+              </a:fillRef>
+              <a:effectRef idx="0">
+                <a:schemeClr val="dk1"/>
+              </a:effectRef>
+              <a:fontRef idx="minor">
+                <a:schemeClr val="dk1"/>
+              </a:fontRef>
+            </p:style>
+            <p:txBody>
+              <a:bodyPr rtlCol="0" anchor="b"/>
+              <a:lstStyle/>
+              <a:p>
+                <a:pPr algn="ctr"/>
+                <a:r>
+                  <a:rPr lang="en-US" sz="1500" dirty="0"/>
+                  <a:t>John Smith</a:t>
+                </a:r>
+              </a:p>
+              <a:p>
+                <a:pPr algn="ctr"/>
+                <a:r>
+                  <a:rPr lang="en-US" sz="1500" dirty="0"/>
+                  <a:t>Incident PCR Number = 15000002</a:t>
+                </a:r>
+              </a:p>
+            </p:txBody>
+          </p:sp>
+          <p:pic>
+            <p:nvPicPr>
+              <p:cNvPr id="65" name="Picture 64">
+                <a:extLst>
+                  <a:ext uri="{FF2B5EF4-FFF2-40B4-BE49-F238E27FC236}">
+                    <a16:creationId xmlns:a16="http://schemas.microsoft.com/office/drawing/2014/main" id="{1530E01E-AD42-E24E-8AB1-357B7F728A6C}"/>
+                  </a:ext>
+                </a:extLst>
+              </p:cNvPr>
+              <p:cNvPicPr>
+                <a:picLocks noChangeAspect="1"/>
+              </p:cNvPicPr>
+              <p:nvPr/>
+            </p:nvPicPr>
+            <p:blipFill>
+              <a:blip r:embed="rId6"/>
+              <a:stretch>
+                <a:fillRect/>
+              </a:stretch>
+            </p:blipFill>
+            <p:spPr>
+              <a:xfrm>
+                <a:off x="7250731" y="2691105"/>
+                <a:ext cx="473110" cy="622795"/>
+              </a:xfrm>
+              <a:prstGeom prst="rect">
+                <a:avLst/>
+              </a:prstGeom>
+            </p:spPr>
+          </p:pic>
+        </p:grpSp>
+        <p:cxnSp>
+          <p:nvCxnSpPr>
+            <p:cNvPr id="67" name="Elbow Connector 66">
+              <a:extLst>
+                <a:ext uri="{FF2B5EF4-FFF2-40B4-BE49-F238E27FC236}">
+                  <a16:creationId xmlns:a16="http://schemas.microsoft.com/office/drawing/2014/main" id="{147CBB19-1307-9542-8CD2-9F36D52B1D6A}"/>
+                </a:ext>
+              </a:extLst>
+            </p:cNvPr>
+            <p:cNvCxnSpPr>
+              <a:stCxn id="34" idx="3"/>
+              <a:endCxn id="64" idx="1"/>
+            </p:cNvCxnSpPr>
+            <p:nvPr/>
+          </p:nvCxnSpPr>
+          <p:spPr>
+            <a:xfrm>
+              <a:off x="6159775" y="2594125"/>
+              <a:ext cx="499525" cy="1951140"/>
+            </a:xfrm>
+            <a:prstGeom prst="bentConnector3">
+              <a:avLst/>
+            </a:prstGeom>
+            <a:ln>
+              <a:tailEnd type="triangle"/>
+            </a:ln>
+          </p:spPr>
+          <p:style>
+            <a:lnRef idx="1">
+              <a:schemeClr val="accent1"/>
+            </a:lnRef>
+            <a:fillRef idx="0">
+              <a:schemeClr val="accent1"/>
+            </a:fillRef>
+            <a:effectRef idx="0">
+              <a:schemeClr val="accent1"/>
+            </a:effectRef>
+            <a:fontRef idx="minor">
+              <a:schemeClr val="tx1"/>
+            </a:fontRef>
+          </p:style>
+        </p:cxnSp>
+        <p:grpSp>
+          <p:nvGrpSpPr>
+            <p:cNvPr id="68" name="Group 67">
+              <a:extLst>
+                <a:ext uri="{FF2B5EF4-FFF2-40B4-BE49-F238E27FC236}">
+                  <a16:creationId xmlns:a16="http://schemas.microsoft.com/office/drawing/2014/main" id="{7627846D-78F2-D646-AF65-A2C915F9FAA9}"/>
+                </a:ext>
+              </a:extLst>
+            </p:cNvPr>
+            <p:cNvGrpSpPr/>
+            <p:nvPr/>
+          </p:nvGrpSpPr>
+          <p:grpSpPr>
+            <a:xfrm>
+              <a:off x="8872432" y="3767613"/>
+              <a:ext cx="1655971" cy="1654698"/>
+              <a:chOff x="8872432" y="2655845"/>
+              <a:chExt cx="1655971" cy="1654698"/>
+            </a:xfrm>
+          </p:grpSpPr>
+          <p:sp>
+            <p:nvSpPr>
+              <p:cNvPr id="69" name="Rounded Rectangle 68">
+                <a:extLst>
+                  <a:ext uri="{FF2B5EF4-FFF2-40B4-BE49-F238E27FC236}">
+                    <a16:creationId xmlns:a16="http://schemas.microsoft.com/office/drawing/2014/main" id="{23F0BFB6-88BF-6147-8F34-426A5C270A76}"/>
+                  </a:ext>
+                </a:extLst>
+              </p:cNvPr>
+              <p:cNvSpPr/>
+              <p:nvPr/>
+            </p:nvSpPr>
+            <p:spPr>
+              <a:xfrm>
+                <a:off x="8872432" y="2655845"/>
+                <a:ext cx="1655971" cy="1654698"/>
+              </a:xfrm>
+              <a:prstGeom prst="roundRect">
+                <a:avLst/>
+              </a:prstGeom>
+            </p:spPr>
+            <p:style>
+              <a:lnRef idx="2">
+                <a:schemeClr val="dk1"/>
+              </a:lnRef>
+              <a:fillRef idx="1">
+                <a:schemeClr val="lt1"/>
+              </a:fillRef>
+              <a:effectRef idx="0">
+                <a:schemeClr val="dk1"/>
+              </a:effectRef>
+              <a:fontRef idx="minor">
+                <a:schemeClr val="dk1"/>
+              </a:fontRef>
+            </p:style>
+            <p:txBody>
+              <a:bodyPr rtlCol="0" anchor="ctr"/>
+              <a:lstStyle/>
+              <a:p>
+                <a:pPr algn="ctr"/>
+                <a:endParaRPr lang="en-US"/>
+              </a:p>
+            </p:txBody>
+          </p:sp>
+          <p:pic>
+            <p:nvPicPr>
+              <p:cNvPr id="70" name="Picture 69">
+                <a:extLst>
+                  <a:ext uri="{FF2B5EF4-FFF2-40B4-BE49-F238E27FC236}">
+                    <a16:creationId xmlns:a16="http://schemas.microsoft.com/office/drawing/2014/main" id="{4D77020B-C923-A041-88DC-94F553168216}"/>
+                  </a:ext>
+                </a:extLst>
+              </p:cNvPr>
+              <p:cNvPicPr>
+                <a:picLocks noChangeAspect="1"/>
+              </p:cNvPicPr>
+              <p:nvPr/>
+            </p:nvPicPr>
+            <p:blipFill>
+              <a:blip r:embed="rId7">
+                <a:extLst>
+                  <a:ext uri="{28A0092B-C50C-407E-A947-70E740481C1C}">
+                    <a14:useLocalDpi xmlns:a14="http://schemas.microsoft.com/office/drawing/2010/main" val="0"/>
+                  </a:ext>
+                </a:extLst>
+              </a:blip>
+              <a:stretch>
+                <a:fillRect/>
+              </a:stretch>
+            </p:blipFill>
+            <p:spPr>
+              <a:xfrm>
+                <a:off x="8997346" y="2890606"/>
+                <a:ext cx="1406141" cy="1185176"/>
+              </a:xfrm>
+              <a:prstGeom prst="rect">
+                <a:avLst/>
+              </a:prstGeom>
+            </p:spPr>
+          </p:pic>
+        </p:grpSp>
+        <p:cxnSp>
+          <p:nvCxnSpPr>
+            <p:cNvPr id="72" name="Straight Arrow Connector 71">
+              <a:extLst>
+                <a:ext uri="{FF2B5EF4-FFF2-40B4-BE49-F238E27FC236}">
+                  <a16:creationId xmlns:a16="http://schemas.microsoft.com/office/drawing/2014/main" id="{C8143593-71C3-6740-BCA4-6137669F8749}"/>
+                </a:ext>
+              </a:extLst>
+            </p:cNvPr>
+            <p:cNvCxnSpPr>
+              <a:stCxn id="64" idx="3"/>
+              <a:endCxn id="69" idx="1"/>
+            </p:cNvCxnSpPr>
+            <p:nvPr/>
+          </p:nvCxnSpPr>
+          <p:spPr>
+            <a:xfrm>
+              <a:off x="8315271" y="4545265"/>
+              <a:ext cx="557161" cy="0"/>
+            </a:xfrm>
+            <a:prstGeom prst="straightConnector1">
+              <a:avLst/>
+            </a:prstGeom>
+            <a:ln>
+              <a:tailEnd type="triangle"/>
+            </a:ln>
+          </p:spPr>
+          <p:style>
+            <a:lnRef idx="1">
+              <a:schemeClr val="accent1"/>
+            </a:lnRef>
+            <a:fillRef idx="0">
+              <a:schemeClr val="accent1"/>
+            </a:fillRef>
+            <a:effectRef idx="0">
+              <a:schemeClr val="accent1"/>
+            </a:effectRef>
+            <a:fontRef idx="minor">
+              <a:schemeClr val="tx1"/>
+            </a:fontRef>
+          </p:style>
+        </p:cxnSp>
+        <p:sp>
+          <p:nvSpPr>
+            <p:cNvPr id="73" name="TextBox 72">
+              <a:extLst>
+                <a:ext uri="{FF2B5EF4-FFF2-40B4-BE49-F238E27FC236}">
+                  <a16:creationId xmlns:a16="http://schemas.microsoft.com/office/drawing/2014/main" id="{EF653C70-4776-BF4E-991D-C52A614C7084}"/>
+                </a:ext>
+              </a:extLst>
+            </p:cNvPr>
+            <p:cNvSpPr txBox="1"/>
+            <p:nvPr/>
+          </p:nvSpPr>
+          <p:spPr>
+            <a:xfrm>
+              <a:off x="6701370" y="5558240"/>
+              <a:ext cx="4001212" cy="662724"/>
+            </a:xfrm>
+            <a:prstGeom prst="rect">
+              <a:avLst/>
+            </a:prstGeom>
+            <a:noFill/>
+          </p:spPr>
+          <p:txBody>
+            <a:bodyPr wrap="square" rtlCol="0">
+              <a:spAutoFit/>
+            </a:bodyPr>
+            <a:lstStyle/>
+            <a:p>
+              <a:pPr algn="ctr"/>
+              <a:r>
+                <a:rPr lang="en-US" sz="1400" dirty="0"/>
+                <a:t>4. If there is more than one patient at the incident, each one is given a separate record, and a unique </a:t>
+              </a:r>
+              <a:r>
+                <a:rPr lang="en-US" sz="1400" b="1" dirty="0"/>
+                <a:t>incident PCR number</a:t>
+              </a:r>
+              <a:r>
+                <a:rPr lang="en-US" sz="1400" dirty="0"/>
+                <a:t>, in </a:t>
+              </a:r>
+              <a:r>
+                <a:rPr lang="en-US" sz="1400" dirty="0" err="1"/>
+                <a:t>MedStar’s</a:t>
+              </a:r>
+              <a:r>
+                <a:rPr lang="en-US" sz="1400" dirty="0"/>
+                <a:t> </a:t>
+              </a:r>
+              <a:r>
+                <a:rPr lang="en-US" sz="1400" dirty="0" err="1"/>
+                <a:t>ePCR</a:t>
+              </a:r>
+              <a:r>
+                <a:rPr lang="en-US" sz="1400" dirty="0"/>
+                <a:t>.</a:t>
+              </a:r>
+            </a:p>
+          </p:txBody>
+        </p:sp>
+      </p:grpSp>
     </p:spTree>
     <p:extLst>
       <p:ext uri="{BB962C8B-B14F-4D97-AF65-F5344CB8AC3E}">
         <p14:creationId xmlns:p14="http://schemas.microsoft.com/office/powerpoint/2010/main" val="3959532915"/>
+      </p:ext>
+    </p:extLst>
+  </p:cSld>
+  <p:clrMapOvr>
+    <a:masterClrMapping/>
+  </p:clrMapOvr>
+</p:sld>
+</file>
+
+<file path=ppt/slides/slide4.xml><?xml version="1.0" encoding="utf-8"?>
+<p:sld xmlns:a="http://schemas.openxmlformats.org/drawingml/2006/main" xmlns:r="http://schemas.openxmlformats.org/officeDocument/2006/relationships" xmlns:p="http://schemas.openxmlformats.org/presentationml/2006/main">
+  <p:cSld>
+    <p:spTree>
+      <p:nvGrpSpPr>
+        <p:cNvPr id="1" name=""/>
+        <p:cNvGrpSpPr/>
+        <p:nvPr/>
+      </p:nvGrpSpPr>
+      <p:grpSpPr>
+        <a:xfrm>
+          <a:off x="0" y="0"/>
+          <a:ext cx="0" cy="0"/>
+          <a:chOff x="0" y="0"/>
+          <a:chExt cx="0" cy="0"/>
+        </a:xfrm>
+      </p:grpSpPr>
+    </p:spTree>
+    <p:extLst>
+      <p:ext uri="{BB962C8B-B14F-4D97-AF65-F5344CB8AC3E}">
+        <p14:creationId xmlns:p14="http://schemas.microsoft.com/office/powerpoint/2010/main" val="1630810266"/>
       </p:ext>
     </p:extLst>
   </p:cSld>

</xml_diff>